<commit_message>
PPT updated and renamed emf_bot to bot.py
</commit_message>
<xml_diff>
--- a/PPT-Presentation.pptx
+++ b/PPT-Presentation.pptx
@@ -4,12 +4,15 @@
   <p:sldMasterIdLst>
     <p:sldMasterId id="2147483706" r:id="rId1"/>
   </p:sldMasterIdLst>
+  <p:notesMasterIdLst>
+    <p:notesMasterId r:id="rId10"/>
+  </p:notesMasterIdLst>
   <p:sldIdLst>
     <p:sldId id="256" r:id="rId2"/>
     <p:sldId id="257" r:id="rId3"/>
     <p:sldId id="258" r:id="rId4"/>
-    <p:sldId id="260" r:id="rId5"/>
-    <p:sldId id="262" r:id="rId6"/>
+    <p:sldId id="262" r:id="rId5"/>
+    <p:sldId id="260" r:id="rId6"/>
     <p:sldId id="266" r:id="rId7"/>
     <p:sldId id="263" r:id="rId8"/>
     <p:sldId id="265" r:id="rId9"/>
@@ -119,6 +122,1065 @@
 </p:presentation>
 </file>
 
+<file path=ppt/notesMasters/notesMaster1.xml><?xml version="1.0" encoding="utf-8"?>
+<p:notesMaster xmlns:a="http://schemas.openxmlformats.org/drawingml/2006/main" xmlns:r="http://schemas.openxmlformats.org/officeDocument/2006/relationships" xmlns:p="http://schemas.openxmlformats.org/presentationml/2006/main">
+  <p:cSld>
+    <p:bg>
+      <p:bgRef idx="1001">
+        <a:schemeClr val="bg1"/>
+      </p:bgRef>
+    </p:bg>
+    <p:spTree>
+      <p:nvGrpSpPr>
+        <p:cNvPr id="1" name=""/>
+        <p:cNvGrpSpPr/>
+        <p:nvPr/>
+      </p:nvGrpSpPr>
+      <p:grpSpPr>
+        <a:xfrm>
+          <a:off x="0" y="0"/>
+          <a:ext cx="0" cy="0"/>
+          <a:chOff x="0" y="0"/>
+          <a:chExt cx="0" cy="0"/>
+        </a:xfrm>
+      </p:grpSpPr>
+      <p:sp>
+        <p:nvSpPr>
+          <p:cNvPr id="2" name="Header Placeholder 1"/>
+          <p:cNvSpPr>
+            <a:spLocks noGrp="1"/>
+          </p:cNvSpPr>
+          <p:nvPr>
+            <p:ph type="hdr" sz="quarter"/>
+          </p:nvPr>
+        </p:nvSpPr>
+        <p:spPr>
+          <a:xfrm>
+            <a:off x="0" y="0"/>
+            <a:ext cx="2971800" cy="458788"/>
+          </a:xfrm>
+          <a:prstGeom prst="rect">
+            <a:avLst/>
+          </a:prstGeom>
+        </p:spPr>
+        <p:txBody>
+          <a:bodyPr vert="horz" lIns="91440" tIns="45720" rIns="91440" bIns="45720" rtlCol="0"/>
+          <a:lstStyle>
+            <a:lvl1pPr algn="l">
+              <a:defRPr sz="1200"/>
+            </a:lvl1pPr>
+          </a:lstStyle>
+          <a:p>
+            <a:endParaRPr lang="en-US"/>
+          </a:p>
+        </p:txBody>
+      </p:sp>
+      <p:sp>
+        <p:nvSpPr>
+          <p:cNvPr id="3" name="Date Placeholder 2"/>
+          <p:cNvSpPr>
+            <a:spLocks noGrp="1"/>
+          </p:cNvSpPr>
+          <p:nvPr>
+            <p:ph type="dt" idx="1"/>
+          </p:nvPr>
+        </p:nvSpPr>
+        <p:spPr>
+          <a:xfrm>
+            <a:off x="3884613" y="0"/>
+            <a:ext cx="2971800" cy="458788"/>
+          </a:xfrm>
+          <a:prstGeom prst="rect">
+            <a:avLst/>
+          </a:prstGeom>
+        </p:spPr>
+        <p:txBody>
+          <a:bodyPr vert="horz" lIns="91440" tIns="45720" rIns="91440" bIns="45720" rtlCol="0"/>
+          <a:lstStyle>
+            <a:lvl1pPr algn="r">
+              <a:defRPr sz="1200"/>
+            </a:lvl1pPr>
+          </a:lstStyle>
+          <a:p>
+            <a:fld id="{02DB2513-EE81-3949-8648-A8B18049EE33}" type="datetimeFigureOut">
+              <a:rPr lang="en-US" smtClean="0"/>
+              <a:t>5/6/20</a:t>
+            </a:fld>
+            <a:endParaRPr lang="en-US"/>
+          </a:p>
+        </p:txBody>
+      </p:sp>
+      <p:sp>
+        <p:nvSpPr>
+          <p:cNvPr id="4" name="Slide Image Placeholder 3"/>
+          <p:cNvSpPr>
+            <a:spLocks noGrp="1" noRot="1" noChangeAspect="1"/>
+          </p:cNvSpPr>
+          <p:nvPr>
+            <p:ph type="sldImg" idx="2"/>
+          </p:nvPr>
+        </p:nvSpPr>
+        <p:spPr>
+          <a:xfrm>
+            <a:off x="685800" y="1143000"/>
+            <a:ext cx="5486400" cy="3086100"/>
+          </a:xfrm>
+          <a:prstGeom prst="rect">
+            <a:avLst/>
+          </a:prstGeom>
+          <a:noFill/>
+          <a:ln w="12700">
+            <a:solidFill>
+              <a:prstClr val="black"/>
+            </a:solidFill>
+          </a:ln>
+        </p:spPr>
+        <p:txBody>
+          <a:bodyPr vert="horz" lIns="91440" tIns="45720" rIns="91440" bIns="45720" rtlCol="0" anchor="ctr"/>
+          <a:lstStyle/>
+          <a:p>
+            <a:endParaRPr lang="en-US"/>
+          </a:p>
+        </p:txBody>
+      </p:sp>
+      <p:sp>
+        <p:nvSpPr>
+          <p:cNvPr id="5" name="Notes Placeholder 4"/>
+          <p:cNvSpPr>
+            <a:spLocks noGrp="1"/>
+          </p:cNvSpPr>
+          <p:nvPr>
+            <p:ph type="body" sz="quarter" idx="3"/>
+          </p:nvPr>
+        </p:nvSpPr>
+        <p:spPr>
+          <a:xfrm>
+            <a:off x="685800" y="4400550"/>
+            <a:ext cx="5486400" cy="3600450"/>
+          </a:xfrm>
+          <a:prstGeom prst="rect">
+            <a:avLst/>
+          </a:prstGeom>
+        </p:spPr>
+        <p:txBody>
+          <a:bodyPr vert="horz" lIns="91440" tIns="45720" rIns="91440" bIns="45720" rtlCol="0"/>
+          <a:lstStyle/>
+          <a:p>
+            <a:pPr lvl="0"/>
+            <a:r>
+              <a:rPr lang="en-US"/>
+              <a:t>Click to edit Master text styles</a:t>
+            </a:r>
+          </a:p>
+          <a:p>
+            <a:pPr lvl="1"/>
+            <a:r>
+              <a:rPr lang="en-US"/>
+              <a:t>Second level</a:t>
+            </a:r>
+          </a:p>
+          <a:p>
+            <a:pPr lvl="2"/>
+            <a:r>
+              <a:rPr lang="en-US"/>
+              <a:t>Third level</a:t>
+            </a:r>
+          </a:p>
+          <a:p>
+            <a:pPr lvl="3"/>
+            <a:r>
+              <a:rPr lang="en-US"/>
+              <a:t>Fourth level</a:t>
+            </a:r>
+          </a:p>
+          <a:p>
+            <a:pPr lvl="4"/>
+            <a:r>
+              <a:rPr lang="en-US"/>
+              <a:t>Fifth level</a:t>
+            </a:r>
+          </a:p>
+        </p:txBody>
+      </p:sp>
+      <p:sp>
+        <p:nvSpPr>
+          <p:cNvPr id="6" name="Footer Placeholder 5"/>
+          <p:cNvSpPr>
+            <a:spLocks noGrp="1"/>
+          </p:cNvSpPr>
+          <p:nvPr>
+            <p:ph type="ftr" sz="quarter" idx="4"/>
+          </p:nvPr>
+        </p:nvSpPr>
+        <p:spPr>
+          <a:xfrm>
+            <a:off x="0" y="8685213"/>
+            <a:ext cx="2971800" cy="458787"/>
+          </a:xfrm>
+          <a:prstGeom prst="rect">
+            <a:avLst/>
+          </a:prstGeom>
+        </p:spPr>
+        <p:txBody>
+          <a:bodyPr vert="horz" lIns="91440" tIns="45720" rIns="91440" bIns="45720" rtlCol="0" anchor="b"/>
+          <a:lstStyle>
+            <a:lvl1pPr algn="l">
+              <a:defRPr sz="1200"/>
+            </a:lvl1pPr>
+          </a:lstStyle>
+          <a:p>
+            <a:endParaRPr lang="en-US"/>
+          </a:p>
+        </p:txBody>
+      </p:sp>
+      <p:sp>
+        <p:nvSpPr>
+          <p:cNvPr id="7" name="Slide Number Placeholder 6"/>
+          <p:cNvSpPr>
+            <a:spLocks noGrp="1"/>
+          </p:cNvSpPr>
+          <p:nvPr>
+            <p:ph type="sldNum" sz="quarter" idx="5"/>
+          </p:nvPr>
+        </p:nvSpPr>
+        <p:spPr>
+          <a:xfrm>
+            <a:off x="3884613" y="8685213"/>
+            <a:ext cx="2971800" cy="458787"/>
+          </a:xfrm>
+          <a:prstGeom prst="rect">
+            <a:avLst/>
+          </a:prstGeom>
+        </p:spPr>
+        <p:txBody>
+          <a:bodyPr vert="horz" lIns="91440" tIns="45720" rIns="91440" bIns="45720" rtlCol="0" anchor="b"/>
+          <a:lstStyle>
+            <a:lvl1pPr algn="r">
+              <a:defRPr sz="1200"/>
+            </a:lvl1pPr>
+          </a:lstStyle>
+          <a:p>
+            <a:fld id="{0173BC3D-24DE-A949-9F49-F613FFF916E4}" type="slidenum">
+              <a:rPr lang="en-US" smtClean="0"/>
+              <a:t>‹#›</a:t>
+            </a:fld>
+            <a:endParaRPr lang="en-US"/>
+          </a:p>
+        </p:txBody>
+      </p:sp>
+    </p:spTree>
+    <p:extLst>
+      <p:ext uri="{BB962C8B-B14F-4D97-AF65-F5344CB8AC3E}">
+        <p14:creationId xmlns:p14="http://schemas.microsoft.com/office/powerpoint/2010/main" val="3081155232"/>
+      </p:ext>
+    </p:extLst>
+  </p:cSld>
+  <p:clrMap bg1="lt1" tx1="dk1" bg2="lt2" tx2="dk2" accent1="accent1" accent2="accent2" accent3="accent3" accent4="accent4" accent5="accent5" accent6="accent6" hlink="hlink" folHlink="folHlink"/>
+  <p:notesStyle>
+    <a:lvl1pPr marL="0" algn="l" defTabSz="914400" rtl="0" eaLnBrk="1" latinLnBrk="0" hangingPunct="1">
+      <a:defRPr sz="1200" kern="1200">
+        <a:solidFill>
+          <a:schemeClr val="tx1"/>
+        </a:solidFill>
+        <a:latin typeface="+mn-lt"/>
+        <a:ea typeface="+mn-ea"/>
+        <a:cs typeface="+mn-cs"/>
+      </a:defRPr>
+    </a:lvl1pPr>
+    <a:lvl2pPr marL="457200" algn="l" defTabSz="914400" rtl="0" eaLnBrk="1" latinLnBrk="0" hangingPunct="1">
+      <a:defRPr sz="1200" kern="1200">
+        <a:solidFill>
+          <a:schemeClr val="tx1"/>
+        </a:solidFill>
+        <a:latin typeface="+mn-lt"/>
+        <a:ea typeface="+mn-ea"/>
+        <a:cs typeface="+mn-cs"/>
+      </a:defRPr>
+    </a:lvl2pPr>
+    <a:lvl3pPr marL="914400" algn="l" defTabSz="914400" rtl="0" eaLnBrk="1" latinLnBrk="0" hangingPunct="1">
+      <a:defRPr sz="1200" kern="1200">
+        <a:solidFill>
+          <a:schemeClr val="tx1"/>
+        </a:solidFill>
+        <a:latin typeface="+mn-lt"/>
+        <a:ea typeface="+mn-ea"/>
+        <a:cs typeface="+mn-cs"/>
+      </a:defRPr>
+    </a:lvl3pPr>
+    <a:lvl4pPr marL="1371600" algn="l" defTabSz="914400" rtl="0" eaLnBrk="1" latinLnBrk="0" hangingPunct="1">
+      <a:defRPr sz="1200" kern="1200">
+        <a:solidFill>
+          <a:schemeClr val="tx1"/>
+        </a:solidFill>
+        <a:latin typeface="+mn-lt"/>
+        <a:ea typeface="+mn-ea"/>
+        <a:cs typeface="+mn-cs"/>
+      </a:defRPr>
+    </a:lvl4pPr>
+    <a:lvl5pPr marL="1828800" algn="l" defTabSz="914400" rtl="0" eaLnBrk="1" latinLnBrk="0" hangingPunct="1">
+      <a:defRPr sz="1200" kern="1200">
+        <a:solidFill>
+          <a:schemeClr val="tx1"/>
+        </a:solidFill>
+        <a:latin typeface="+mn-lt"/>
+        <a:ea typeface="+mn-ea"/>
+        <a:cs typeface="+mn-cs"/>
+      </a:defRPr>
+    </a:lvl5pPr>
+    <a:lvl6pPr marL="2286000" algn="l" defTabSz="914400" rtl="0" eaLnBrk="1" latinLnBrk="0" hangingPunct="1">
+      <a:defRPr sz="1200" kern="1200">
+        <a:solidFill>
+          <a:schemeClr val="tx1"/>
+        </a:solidFill>
+        <a:latin typeface="+mn-lt"/>
+        <a:ea typeface="+mn-ea"/>
+        <a:cs typeface="+mn-cs"/>
+      </a:defRPr>
+    </a:lvl6pPr>
+    <a:lvl7pPr marL="2743200" algn="l" defTabSz="914400" rtl="0" eaLnBrk="1" latinLnBrk="0" hangingPunct="1">
+      <a:defRPr sz="1200" kern="1200">
+        <a:solidFill>
+          <a:schemeClr val="tx1"/>
+        </a:solidFill>
+        <a:latin typeface="+mn-lt"/>
+        <a:ea typeface="+mn-ea"/>
+        <a:cs typeface="+mn-cs"/>
+      </a:defRPr>
+    </a:lvl7pPr>
+    <a:lvl8pPr marL="3200400" algn="l" defTabSz="914400" rtl="0" eaLnBrk="1" latinLnBrk="0" hangingPunct="1">
+      <a:defRPr sz="1200" kern="1200">
+        <a:solidFill>
+          <a:schemeClr val="tx1"/>
+        </a:solidFill>
+        <a:latin typeface="+mn-lt"/>
+        <a:ea typeface="+mn-ea"/>
+        <a:cs typeface="+mn-cs"/>
+      </a:defRPr>
+    </a:lvl8pPr>
+    <a:lvl9pPr marL="3657600" algn="l" defTabSz="914400" rtl="0" eaLnBrk="1" latinLnBrk="0" hangingPunct="1">
+      <a:defRPr sz="1200" kern="1200">
+        <a:solidFill>
+          <a:schemeClr val="tx1"/>
+        </a:solidFill>
+        <a:latin typeface="+mn-lt"/>
+        <a:ea typeface="+mn-ea"/>
+        <a:cs typeface="+mn-cs"/>
+      </a:defRPr>
+    </a:lvl9pPr>
+  </p:notesStyle>
+</p:notesMaster>
+</file>
+
+<file path=ppt/notesSlides/notesSlide1.xml><?xml version="1.0" encoding="utf-8"?>
+<p:notes xmlns:a="http://schemas.openxmlformats.org/drawingml/2006/main" xmlns:r="http://schemas.openxmlformats.org/officeDocument/2006/relationships" xmlns:p="http://schemas.openxmlformats.org/presentationml/2006/main">
+  <p:cSld>
+    <p:spTree>
+      <p:nvGrpSpPr>
+        <p:cNvPr id="1" name=""/>
+        <p:cNvGrpSpPr/>
+        <p:nvPr/>
+      </p:nvGrpSpPr>
+      <p:grpSpPr>
+        <a:xfrm>
+          <a:off x="0" y="0"/>
+          <a:ext cx="0" cy="0"/>
+          <a:chOff x="0" y="0"/>
+          <a:chExt cx="0" cy="0"/>
+        </a:xfrm>
+      </p:grpSpPr>
+      <p:sp>
+        <p:nvSpPr>
+          <p:cNvPr id="2" name="Slide Image Placeholder 1"/>
+          <p:cNvSpPr>
+            <a:spLocks noGrp="1" noRot="1" noChangeAspect="1"/>
+          </p:cNvSpPr>
+          <p:nvPr>
+            <p:ph type="sldImg"/>
+          </p:nvPr>
+        </p:nvSpPr>
+        <p:spPr/>
+      </p:sp>
+      <p:sp>
+        <p:nvSpPr>
+          <p:cNvPr id="3" name="Notes Placeholder 2"/>
+          <p:cNvSpPr>
+            <a:spLocks noGrp="1"/>
+          </p:cNvSpPr>
+          <p:nvPr>
+            <p:ph type="body" idx="1"/>
+          </p:nvPr>
+        </p:nvSpPr>
+        <p:spPr/>
+        <p:txBody>
+          <a:bodyPr/>
+          <a:lstStyle/>
+          <a:p>
+            <a:r>
+              <a:rPr lang="en-US" dirty="0"/>
+              <a:t>In today’s world the technology is extensively going forward towards analytics and future prediction. The ”DATA” plays and vital role in making such decisions. We tend to create Ad-hoc OLAP queries to retrieve various kinds of data from the Database. Although Ad – hoc OLAP is significantly used but it becomes an overhead to validate and maintain such huge queries.</a:t>
+            </a:r>
+          </a:p>
+          <a:p>
+            <a:endParaRPr lang="en-US" dirty="0"/>
+          </a:p>
+          <a:p>
+            <a:r>
+              <a:rPr lang="en-US" dirty="0"/>
+              <a:t>To solve this problem we introduce SQL EXPRESS which provides a succinct way to represent these queries for efficient evaluation. Unlike traditional SQL optimizer, SQL express focuses on the SEMANTICS and ”BIGGER PICTURE” of the query.</a:t>
+            </a:r>
+          </a:p>
+        </p:txBody>
+      </p:sp>
+      <p:sp>
+        <p:nvSpPr>
+          <p:cNvPr id="4" name="Slide Number Placeholder 3"/>
+          <p:cNvSpPr>
+            <a:spLocks noGrp="1"/>
+          </p:cNvSpPr>
+          <p:nvPr>
+            <p:ph type="sldNum" sz="quarter" idx="5"/>
+          </p:nvPr>
+        </p:nvSpPr>
+        <p:spPr/>
+        <p:txBody>
+          <a:bodyPr/>
+          <a:lstStyle/>
+          <a:p>
+            <a:fld id="{0173BC3D-24DE-A949-9F49-F613FFF916E4}" type="slidenum">
+              <a:rPr lang="en-US" smtClean="0"/>
+              <a:t>2</a:t>
+            </a:fld>
+            <a:endParaRPr lang="en-US"/>
+          </a:p>
+        </p:txBody>
+      </p:sp>
+    </p:spTree>
+    <p:extLst>
+      <p:ext uri="{BB962C8B-B14F-4D97-AF65-F5344CB8AC3E}">
+        <p14:creationId xmlns:p14="http://schemas.microsoft.com/office/powerpoint/2010/main" val="1841181224"/>
+      </p:ext>
+    </p:extLst>
+  </p:cSld>
+  <p:clrMapOvr>
+    <a:masterClrMapping/>
+  </p:clrMapOvr>
+</p:notes>
+</file>
+
+<file path=ppt/notesSlides/notesSlide2.xml><?xml version="1.0" encoding="utf-8"?>
+<p:notes xmlns:a="http://schemas.openxmlformats.org/drawingml/2006/main" xmlns:r="http://schemas.openxmlformats.org/officeDocument/2006/relationships" xmlns:p="http://schemas.openxmlformats.org/presentationml/2006/main">
+  <p:cSld>
+    <p:spTree>
+      <p:nvGrpSpPr>
+        <p:cNvPr id="1" name=""/>
+        <p:cNvGrpSpPr/>
+        <p:nvPr/>
+      </p:nvGrpSpPr>
+      <p:grpSpPr>
+        <a:xfrm>
+          <a:off x="0" y="0"/>
+          <a:ext cx="0" cy="0"/>
+          <a:chOff x="0" y="0"/>
+          <a:chExt cx="0" cy="0"/>
+        </a:xfrm>
+      </p:grpSpPr>
+      <p:sp>
+        <p:nvSpPr>
+          <p:cNvPr id="2" name="Slide Image Placeholder 1"/>
+          <p:cNvSpPr>
+            <a:spLocks noGrp="1" noRot="1" noChangeAspect="1"/>
+          </p:cNvSpPr>
+          <p:nvPr>
+            <p:ph type="sldImg"/>
+          </p:nvPr>
+        </p:nvSpPr>
+        <p:spPr/>
+      </p:sp>
+      <p:sp>
+        <p:nvSpPr>
+          <p:cNvPr id="3" name="Notes Placeholder 2"/>
+          <p:cNvSpPr>
+            <a:spLocks noGrp="1"/>
+          </p:cNvSpPr>
+          <p:nvPr>
+            <p:ph type="body" idx="1"/>
+          </p:nvPr>
+        </p:nvSpPr>
+        <p:spPr/>
+        <p:txBody>
+          <a:bodyPr/>
+          <a:lstStyle/>
+          <a:p>
+            <a:r>
+              <a:rPr lang="en-US" dirty="0"/>
+              <a:t>We used the concept of grouping variables to reduce the confusion of the query optimizer while it processes the traditional </a:t>
+            </a:r>
+            <a:r>
+              <a:rPr lang="en-US" dirty="0" err="1"/>
+              <a:t>SQl</a:t>
+            </a:r>
+            <a:r>
+              <a:rPr lang="en-US" dirty="0"/>
+              <a:t> queries. </a:t>
+            </a:r>
+          </a:p>
+          <a:p>
+            <a:r>
+              <a:rPr lang="en-US" dirty="0"/>
+              <a:t>Grouping variable are used to categorize the data into several groups to make the analysis much easier and faster.</a:t>
+            </a:r>
+          </a:p>
+          <a:p>
+            <a:r>
+              <a:rPr lang="en-US" dirty="0"/>
+              <a:t>So here comes the concept of Multi-feature Queries and Extended-multifeatured queries, using this syntax we overcome the tedious process  of writing multiple with statements and views. </a:t>
+            </a:r>
+          </a:p>
+          <a:p>
+            <a:endParaRPr lang="en-US" dirty="0"/>
+          </a:p>
+          <a:p>
+            <a:endParaRPr lang="en-US" dirty="0"/>
+          </a:p>
+          <a:p>
+            <a:r>
+              <a:rPr lang="en-US" dirty="0"/>
+              <a:t>So the MF EMF queries are very effective as their syntax supports the concept of grouping variable where in MF query, the scope of the grouping variable is limited to the grouping attributes in EMF </a:t>
+            </a:r>
+          </a:p>
+          <a:p>
+            <a:r>
+              <a:rPr lang="en-US" dirty="0"/>
+              <a:t>the scope of the grouping variables extends outside the group.</a:t>
+            </a:r>
+          </a:p>
+        </p:txBody>
+      </p:sp>
+      <p:sp>
+        <p:nvSpPr>
+          <p:cNvPr id="4" name="Slide Number Placeholder 3"/>
+          <p:cNvSpPr>
+            <a:spLocks noGrp="1"/>
+          </p:cNvSpPr>
+          <p:nvPr>
+            <p:ph type="sldNum" sz="quarter" idx="5"/>
+          </p:nvPr>
+        </p:nvSpPr>
+        <p:spPr/>
+        <p:txBody>
+          <a:bodyPr/>
+          <a:lstStyle/>
+          <a:p>
+            <a:fld id="{0173BC3D-24DE-A949-9F49-F613FFF916E4}" type="slidenum">
+              <a:rPr lang="en-US" smtClean="0"/>
+              <a:t>3</a:t>
+            </a:fld>
+            <a:endParaRPr lang="en-US"/>
+          </a:p>
+        </p:txBody>
+      </p:sp>
+    </p:spTree>
+    <p:extLst>
+      <p:ext uri="{BB962C8B-B14F-4D97-AF65-F5344CB8AC3E}">
+        <p14:creationId xmlns:p14="http://schemas.microsoft.com/office/powerpoint/2010/main" val="3755216861"/>
+      </p:ext>
+    </p:extLst>
+  </p:cSld>
+  <p:clrMapOvr>
+    <a:masterClrMapping/>
+  </p:clrMapOvr>
+</p:notes>
+</file>
+
+<file path=ppt/notesSlides/notesSlide3.xml><?xml version="1.0" encoding="utf-8"?>
+<p:notes xmlns:a="http://schemas.openxmlformats.org/drawingml/2006/main" xmlns:r="http://schemas.openxmlformats.org/officeDocument/2006/relationships" xmlns:p="http://schemas.openxmlformats.org/presentationml/2006/main">
+  <p:cSld>
+    <p:spTree>
+      <p:nvGrpSpPr>
+        <p:cNvPr id="1" name=""/>
+        <p:cNvGrpSpPr/>
+        <p:nvPr/>
+      </p:nvGrpSpPr>
+      <p:grpSpPr>
+        <a:xfrm>
+          <a:off x="0" y="0"/>
+          <a:ext cx="0" cy="0"/>
+          <a:chOff x="0" y="0"/>
+          <a:chExt cx="0" cy="0"/>
+        </a:xfrm>
+      </p:grpSpPr>
+      <p:sp>
+        <p:nvSpPr>
+          <p:cNvPr id="2" name="Slide Image Placeholder 1"/>
+          <p:cNvSpPr>
+            <a:spLocks noGrp="1" noRot="1" noChangeAspect="1"/>
+          </p:cNvSpPr>
+          <p:nvPr>
+            <p:ph type="sldImg"/>
+          </p:nvPr>
+        </p:nvSpPr>
+        <p:spPr/>
+      </p:sp>
+      <p:sp>
+        <p:nvSpPr>
+          <p:cNvPr id="3" name="Notes Placeholder 2"/>
+          <p:cNvSpPr>
+            <a:spLocks noGrp="1"/>
+          </p:cNvSpPr>
+          <p:nvPr>
+            <p:ph type="body" idx="1"/>
+          </p:nvPr>
+        </p:nvSpPr>
+        <p:spPr/>
+        <p:txBody>
+          <a:bodyPr/>
+          <a:lstStyle/>
+          <a:p>
+            <a:r>
+              <a:rPr lang="en-US" dirty="0"/>
+              <a:t>Let’s consider the following example, which is largely used  (Pivoting queries).  In this we try to find for each customer the average sale in NY,  NJ and CT and display only those rows if NY’s average is greater than that of the other two states. </a:t>
+            </a:r>
+          </a:p>
+          <a:p>
+            <a:endParaRPr lang="en-US" dirty="0"/>
+          </a:p>
+          <a:p>
+            <a:r>
+              <a:rPr lang="en-US" dirty="0"/>
+              <a:t>In traditional SQL we create 3 separate views of each state to compute the average aggregation and finally join those views with a where clause.  </a:t>
+            </a:r>
+          </a:p>
+          <a:p>
+            <a:endParaRPr lang="en-US" dirty="0"/>
+          </a:p>
+          <a:p>
+            <a:r>
+              <a:rPr lang="en-US" dirty="0"/>
+              <a:t>The same query in MF can be created by using 3 grouping variables which corresponds to the states NY, NJ and CT. And finally with a having clause we can project only those rows for NY’s avg is greater than the other two.</a:t>
+            </a:r>
+          </a:p>
+          <a:p>
+            <a:endParaRPr lang="en-US" dirty="0"/>
+          </a:p>
+          <a:p>
+            <a:r>
+              <a:rPr lang="en-US" dirty="0"/>
+              <a:t>As we can see that the MF style is much succinct than the traditional SQL.</a:t>
+            </a:r>
+          </a:p>
+          <a:p>
+            <a:endParaRPr lang="en-US" dirty="0"/>
+          </a:p>
+        </p:txBody>
+      </p:sp>
+      <p:sp>
+        <p:nvSpPr>
+          <p:cNvPr id="4" name="Slide Number Placeholder 3"/>
+          <p:cNvSpPr>
+            <a:spLocks noGrp="1"/>
+          </p:cNvSpPr>
+          <p:nvPr>
+            <p:ph type="sldNum" sz="quarter" idx="5"/>
+          </p:nvPr>
+        </p:nvSpPr>
+        <p:spPr/>
+        <p:txBody>
+          <a:bodyPr/>
+          <a:lstStyle/>
+          <a:p>
+            <a:fld id="{0173BC3D-24DE-A949-9F49-F613FFF916E4}" type="slidenum">
+              <a:rPr lang="en-US" smtClean="0"/>
+              <a:t>4</a:t>
+            </a:fld>
+            <a:endParaRPr lang="en-US"/>
+          </a:p>
+        </p:txBody>
+      </p:sp>
+    </p:spTree>
+    <p:extLst>
+      <p:ext uri="{BB962C8B-B14F-4D97-AF65-F5344CB8AC3E}">
+        <p14:creationId xmlns:p14="http://schemas.microsoft.com/office/powerpoint/2010/main" val="3998736028"/>
+      </p:ext>
+    </p:extLst>
+  </p:cSld>
+  <p:clrMapOvr>
+    <a:masterClrMapping/>
+  </p:clrMapOvr>
+</p:notes>
+</file>
+
+<file path=ppt/notesSlides/notesSlide4.xml><?xml version="1.0" encoding="utf-8"?>
+<p:notes xmlns:a="http://schemas.openxmlformats.org/drawingml/2006/main" xmlns:r="http://schemas.openxmlformats.org/officeDocument/2006/relationships" xmlns:p="http://schemas.openxmlformats.org/presentationml/2006/main">
+  <p:cSld>
+    <p:spTree>
+      <p:nvGrpSpPr>
+        <p:cNvPr id="1" name=""/>
+        <p:cNvGrpSpPr/>
+        <p:nvPr/>
+      </p:nvGrpSpPr>
+      <p:grpSpPr>
+        <a:xfrm>
+          <a:off x="0" y="0"/>
+          <a:ext cx="0" cy="0"/>
+          <a:chOff x="0" y="0"/>
+          <a:chExt cx="0" cy="0"/>
+        </a:xfrm>
+      </p:grpSpPr>
+      <p:sp>
+        <p:nvSpPr>
+          <p:cNvPr id="2" name="Slide Image Placeholder 1"/>
+          <p:cNvSpPr>
+            <a:spLocks noGrp="1" noRot="1" noChangeAspect="1"/>
+          </p:cNvSpPr>
+          <p:nvPr>
+            <p:ph type="sldImg"/>
+          </p:nvPr>
+        </p:nvSpPr>
+        <p:spPr/>
+      </p:sp>
+      <p:sp>
+        <p:nvSpPr>
+          <p:cNvPr id="3" name="Notes Placeholder 2"/>
+          <p:cNvSpPr>
+            <a:spLocks noGrp="1"/>
+          </p:cNvSpPr>
+          <p:nvPr>
+            <p:ph type="body" idx="1"/>
+          </p:nvPr>
+        </p:nvSpPr>
+        <p:spPr/>
+        <p:txBody>
+          <a:bodyPr/>
+          <a:lstStyle/>
+          <a:p>
+            <a:r>
+              <a:rPr lang="en-US" dirty="0"/>
+              <a:t>Hierarchical queries are widely used in OLAP. Let's consider the following query where in for each product and sales in 1997 we need to show each month’s total sales as a percentage of year-long total sales. </a:t>
+            </a:r>
+          </a:p>
+          <a:p>
+            <a:r>
+              <a:rPr lang="en-US" dirty="0"/>
+              <a:t>In traditional SQL we tend to write multiple views to store intermediate results to compute the overall query. But in EMF with the help of “such that” clause and grouping variables we can write this query more efficiently. </a:t>
+            </a:r>
+          </a:p>
+          <a:p>
+            <a:endParaRPr lang="en-US" dirty="0"/>
+          </a:p>
+          <a:p>
+            <a:r>
+              <a:rPr lang="en-US" dirty="0"/>
+              <a:t>And moreover EMF acts as syntactic sugar to represent such huge queries. As we can see that the 1</a:t>
+            </a:r>
+            <a:r>
+              <a:rPr lang="en-US" baseline="30000" dirty="0"/>
+              <a:t>st</a:t>
+            </a:r>
+            <a:r>
+              <a:rPr lang="en-US" dirty="0"/>
+              <a:t> grouping variable ’x’ belongs to the combination of (prod, month) and the second grouping variable belongs belongs whole year irrespective of the month.</a:t>
+            </a:r>
+          </a:p>
+          <a:p>
+            <a:endParaRPr lang="en-US" dirty="0"/>
+          </a:p>
+        </p:txBody>
+      </p:sp>
+      <p:sp>
+        <p:nvSpPr>
+          <p:cNvPr id="4" name="Slide Number Placeholder 3"/>
+          <p:cNvSpPr>
+            <a:spLocks noGrp="1"/>
+          </p:cNvSpPr>
+          <p:nvPr>
+            <p:ph type="sldNum" sz="quarter" idx="5"/>
+          </p:nvPr>
+        </p:nvSpPr>
+        <p:spPr/>
+        <p:txBody>
+          <a:bodyPr/>
+          <a:lstStyle/>
+          <a:p>
+            <a:fld id="{0173BC3D-24DE-A949-9F49-F613FFF916E4}" type="slidenum">
+              <a:rPr lang="en-US" smtClean="0"/>
+              <a:t>5</a:t>
+            </a:fld>
+            <a:endParaRPr lang="en-US"/>
+          </a:p>
+        </p:txBody>
+      </p:sp>
+    </p:spTree>
+    <p:extLst>
+      <p:ext uri="{BB962C8B-B14F-4D97-AF65-F5344CB8AC3E}">
+        <p14:creationId xmlns:p14="http://schemas.microsoft.com/office/powerpoint/2010/main" val="1095018115"/>
+      </p:ext>
+    </p:extLst>
+  </p:cSld>
+  <p:clrMapOvr>
+    <a:masterClrMapping/>
+  </p:clrMapOvr>
+</p:notes>
+</file>
+
+<file path=ppt/notesSlides/notesSlide5.xml><?xml version="1.0" encoding="utf-8"?>
+<p:notes xmlns:a="http://schemas.openxmlformats.org/drawingml/2006/main" xmlns:r="http://schemas.openxmlformats.org/officeDocument/2006/relationships" xmlns:p="http://schemas.openxmlformats.org/presentationml/2006/main">
+  <p:cSld>
+    <p:spTree>
+      <p:nvGrpSpPr>
+        <p:cNvPr id="1" name=""/>
+        <p:cNvGrpSpPr/>
+        <p:nvPr/>
+      </p:nvGrpSpPr>
+      <p:grpSpPr>
+        <a:xfrm>
+          <a:off x="0" y="0"/>
+          <a:ext cx="0" cy="0"/>
+          <a:chOff x="0" y="0"/>
+          <a:chExt cx="0" cy="0"/>
+        </a:xfrm>
+      </p:grpSpPr>
+      <p:sp>
+        <p:nvSpPr>
+          <p:cNvPr id="2" name="Slide Image Placeholder 1"/>
+          <p:cNvSpPr>
+            <a:spLocks noGrp="1" noRot="1" noChangeAspect="1"/>
+          </p:cNvSpPr>
+          <p:nvPr>
+            <p:ph type="sldImg"/>
+          </p:nvPr>
+        </p:nvSpPr>
+        <p:spPr/>
+      </p:sp>
+      <p:sp>
+        <p:nvSpPr>
+          <p:cNvPr id="3" name="Notes Placeholder 2"/>
+          <p:cNvSpPr>
+            <a:spLocks noGrp="1"/>
+          </p:cNvSpPr>
+          <p:nvPr>
+            <p:ph type="body" idx="1"/>
+          </p:nvPr>
+        </p:nvSpPr>
+        <p:spPr/>
+        <p:txBody>
+          <a:bodyPr/>
+          <a:lstStyle/>
+          <a:p>
+            <a:pPr marL="171450" indent="-171450">
+              <a:buFont typeface="Arial" panose="020B0604020202020204" pitchFamily="34" charset="0"/>
+              <a:buChar char="•"/>
+            </a:pPr>
+            <a:r>
+              <a:rPr lang="en-US" dirty="0"/>
+              <a:t>The flow of the project goes like this – First we parse the query in the form of JSON file or user input through command line arguments to populate the six parameters needed for the </a:t>
+            </a:r>
+            <a:r>
+              <a:rPr lang="en-US" b="1" i="1" dirty="0"/>
+              <a:t>phi </a:t>
+            </a:r>
+            <a:r>
+              <a:rPr lang="en-US" b="0" i="0" dirty="0"/>
+              <a:t>operator.  </a:t>
+            </a:r>
+          </a:p>
+          <a:p>
+            <a:pPr marL="171450" indent="-171450">
+              <a:buFont typeface="Arial" panose="020B0604020202020204" pitchFamily="34" charset="0"/>
+              <a:buChar char="•"/>
+            </a:pPr>
+            <a:r>
+              <a:rPr lang="en-US" b="0" i="0" dirty="0"/>
+              <a:t>According to the aggregate functions that are present in the f-vector, we generate the necessary aggregate components required to compute the query. </a:t>
+            </a:r>
+          </a:p>
+          <a:p>
+            <a:pPr marL="171450" indent="-171450">
+              <a:buFont typeface="Arial" panose="020B0604020202020204" pitchFamily="34" charset="0"/>
+              <a:buChar char="•"/>
+            </a:pPr>
+            <a:r>
+              <a:rPr lang="en-US" b="0" i="0" dirty="0"/>
+              <a:t>#We then check the f-vector to identify the aggregation components needed to compute the query</a:t>
+            </a:r>
+          </a:p>
+          <a:p>
+            <a:pPr marL="171450" indent="-171450">
+              <a:buFont typeface="Arial" panose="020B0604020202020204" pitchFamily="34" charset="0"/>
+              <a:buChar char="•"/>
+            </a:pPr>
+            <a:r>
+              <a:rPr lang="en-US" b="0" i="0" dirty="0"/>
+              <a:t>After that, we perform the first initial scan on the relation to generate the MF/EMF structure with the group by attributes</a:t>
+            </a:r>
+          </a:p>
+          <a:p>
+            <a:pPr marL="171450" indent="-171450">
+              <a:buFont typeface="Arial" panose="020B0604020202020204" pitchFamily="34" charset="0"/>
+              <a:buChar char="•"/>
+            </a:pPr>
+            <a:r>
+              <a:rPr lang="en-US" b="0" i="0" dirty="0"/>
+              <a:t>We automate the generation of the program with the MF/EMF struct with their aggregate function attributes that are to be computed along with the aggregate components that have been created in the step 2</a:t>
+            </a:r>
+          </a:p>
+          <a:p>
+            <a:pPr marL="171450" indent="-171450">
+              <a:buFont typeface="Arial" panose="020B0604020202020204" pitchFamily="34" charset="0"/>
+              <a:buChar char="•"/>
+            </a:pPr>
+            <a:r>
+              <a:rPr lang="en-US" b="0" i="0" dirty="0"/>
+              <a:t>We calculate all the aggregate function values with respect to their such that conditions and having clause and finally populate the MF/EMF Struct.</a:t>
+            </a:r>
+          </a:p>
+          <a:p>
+            <a:pPr marL="171450" indent="-171450">
+              <a:buFont typeface="Arial" panose="020B0604020202020204" pitchFamily="34" charset="0"/>
+              <a:buChar char="•"/>
+            </a:pPr>
+            <a:r>
+              <a:rPr lang="en-US" b="0" i="0" dirty="0"/>
+              <a:t>At last we generate the final output of the table with the projection attributes.</a:t>
+            </a:r>
+          </a:p>
+          <a:p>
+            <a:pPr marL="171450" indent="-171450">
+              <a:buFont typeface="Arial" panose="020B0604020202020204" pitchFamily="34" charset="0"/>
+              <a:buChar char="•"/>
+            </a:pPr>
+            <a:endParaRPr lang="en-US" b="0" i="0" dirty="0"/>
+          </a:p>
+        </p:txBody>
+      </p:sp>
+      <p:sp>
+        <p:nvSpPr>
+          <p:cNvPr id="4" name="Slide Number Placeholder 3"/>
+          <p:cNvSpPr>
+            <a:spLocks noGrp="1"/>
+          </p:cNvSpPr>
+          <p:nvPr>
+            <p:ph type="sldNum" sz="quarter" idx="5"/>
+          </p:nvPr>
+        </p:nvSpPr>
+        <p:spPr/>
+        <p:txBody>
+          <a:bodyPr/>
+          <a:lstStyle/>
+          <a:p>
+            <a:fld id="{0173BC3D-24DE-A949-9F49-F613FFF916E4}" type="slidenum">
+              <a:rPr lang="en-US" smtClean="0"/>
+              <a:t>6</a:t>
+            </a:fld>
+            <a:endParaRPr lang="en-US"/>
+          </a:p>
+        </p:txBody>
+      </p:sp>
+    </p:spTree>
+    <p:extLst>
+      <p:ext uri="{BB962C8B-B14F-4D97-AF65-F5344CB8AC3E}">
+        <p14:creationId xmlns:p14="http://schemas.microsoft.com/office/powerpoint/2010/main" val="2420209397"/>
+      </p:ext>
+    </p:extLst>
+  </p:cSld>
+  <p:clrMapOvr>
+    <a:masterClrMapping/>
+  </p:clrMapOvr>
+</p:notes>
+</file>
+
+<file path=ppt/notesSlides/notesSlide6.xml><?xml version="1.0" encoding="utf-8"?>
+<p:notes xmlns:a="http://schemas.openxmlformats.org/drawingml/2006/main" xmlns:r="http://schemas.openxmlformats.org/officeDocument/2006/relationships" xmlns:p="http://schemas.openxmlformats.org/presentationml/2006/main">
+  <p:cSld>
+    <p:spTree>
+      <p:nvGrpSpPr>
+        <p:cNvPr id="1" name=""/>
+        <p:cNvGrpSpPr/>
+        <p:nvPr/>
+      </p:nvGrpSpPr>
+      <p:grpSpPr>
+        <a:xfrm>
+          <a:off x="0" y="0"/>
+          <a:ext cx="0" cy="0"/>
+          <a:chOff x="0" y="0"/>
+          <a:chExt cx="0" cy="0"/>
+        </a:xfrm>
+      </p:grpSpPr>
+      <p:sp>
+        <p:nvSpPr>
+          <p:cNvPr id="2" name="Slide Image Placeholder 1"/>
+          <p:cNvSpPr>
+            <a:spLocks noGrp="1" noRot="1" noChangeAspect="1"/>
+          </p:cNvSpPr>
+          <p:nvPr>
+            <p:ph type="sldImg"/>
+          </p:nvPr>
+        </p:nvSpPr>
+        <p:spPr/>
+      </p:sp>
+      <p:sp>
+        <p:nvSpPr>
+          <p:cNvPr id="3" name="Notes Placeholder 2"/>
+          <p:cNvSpPr>
+            <a:spLocks noGrp="1"/>
+          </p:cNvSpPr>
+          <p:nvPr>
+            <p:ph type="body" idx="1"/>
+          </p:nvPr>
+        </p:nvSpPr>
+        <p:spPr/>
+        <p:txBody>
+          <a:bodyPr/>
+          <a:lstStyle/>
+          <a:p>
+            <a:r>
+              <a:rPr lang="en-US" dirty="0"/>
+              <a:t>Until now our SQL express supports the hierarchical queries and pivoting queries</a:t>
+            </a:r>
+          </a:p>
+          <a:p>
+            <a:r>
+              <a:rPr lang="en-US" dirty="0"/>
+              <a:t>As our enhancements and future work we would like to extend it to support the comparison queries and dependent aggregation queries</a:t>
+            </a:r>
+          </a:p>
+        </p:txBody>
+      </p:sp>
+      <p:sp>
+        <p:nvSpPr>
+          <p:cNvPr id="4" name="Slide Number Placeholder 3"/>
+          <p:cNvSpPr>
+            <a:spLocks noGrp="1"/>
+          </p:cNvSpPr>
+          <p:nvPr>
+            <p:ph type="sldNum" sz="quarter" idx="5"/>
+          </p:nvPr>
+        </p:nvSpPr>
+        <p:spPr/>
+        <p:txBody>
+          <a:bodyPr/>
+          <a:lstStyle/>
+          <a:p>
+            <a:fld id="{0173BC3D-24DE-A949-9F49-F613FFF916E4}" type="slidenum">
+              <a:rPr lang="en-US" smtClean="0"/>
+              <a:t>7</a:t>
+            </a:fld>
+            <a:endParaRPr lang="en-US"/>
+          </a:p>
+        </p:txBody>
+      </p:sp>
+    </p:spTree>
+    <p:extLst>
+      <p:ext uri="{BB962C8B-B14F-4D97-AF65-F5344CB8AC3E}">
+        <p14:creationId xmlns:p14="http://schemas.microsoft.com/office/powerpoint/2010/main" val="197375925"/>
+      </p:ext>
+    </p:extLst>
+  </p:cSld>
+  <p:clrMapOvr>
+    <a:masterClrMapping/>
+  </p:clrMapOvr>
+</p:notes>
+</file>
+
 <file path=ppt/slideLayouts/slideLayout1.xml><?xml version="1.0" encoding="utf-8"?>
 <p:sldLayout xmlns:a="http://schemas.openxmlformats.org/drawingml/2006/main" xmlns:r="http://schemas.openxmlformats.org/officeDocument/2006/relationships" xmlns:p="http://schemas.openxmlformats.org/presentationml/2006/main" type="title" preserve="1">
   <p:cSld name="Title Slide">
@@ -357,7 +1419,7 @@
           <a:p>
             <a:fld id="{ED291B17-9318-49DB-B28B-6E5994AE9581}" type="datetime1">
               <a:rPr lang="en-US" smtClean="0"/>
-              <a:t>5/5/20</a:t>
+              <a:t>5/6/20</a:t>
             </a:fld>
             <a:endParaRPr lang="en-US" dirty="0"/>
           </a:p>
@@ -560,7 +1622,7 @@
           <a:p>
             <a:fld id="{2CED4963-E985-44C4-B8C4-FDD613B7C2F8}" type="datetime1">
               <a:rPr lang="en-US" smtClean="0"/>
-              <a:t>5/5/20</a:t>
+              <a:t>5/6/20</a:t>
             </a:fld>
             <a:endParaRPr lang="en-US" dirty="0"/>
           </a:p>
@@ -922,7 +1984,7 @@
           <a:p>
             <a:fld id="{ED291B17-9318-49DB-B28B-6E5994AE9581}" type="datetime1">
               <a:rPr lang="en-US" smtClean="0"/>
-              <a:t>5/5/20</a:t>
+              <a:t>5/6/20</a:t>
             </a:fld>
             <a:endParaRPr lang="en-US" dirty="0"/>
           </a:p>
@@ -1120,7 +2182,7 @@
           <a:p>
             <a:fld id="{78DD82B9-B8EE-4375-B6FF-88FA6ABB15D9}" type="datetime1">
               <a:rPr lang="en-US" smtClean="0"/>
-              <a:t>5/5/20</a:t>
+              <a:t>5/6/20</a:t>
             </a:fld>
             <a:endParaRPr lang="en-US" dirty="0"/>
           </a:p>
@@ -1432,7 +2494,7 @@
           <a:p>
             <a:fld id="{B2497495-0637-405E-AE64-5CC7506D51F5}" type="datetime1">
               <a:rPr lang="en-US" smtClean="0"/>
-              <a:t>5/5/20</a:t>
+              <a:t>5/6/20</a:t>
             </a:fld>
             <a:endParaRPr lang="en-US" dirty="0"/>
           </a:p>
@@ -1685,7 +2747,7 @@
           <a:p>
             <a:fld id="{7BFFD690-9426-415D-8B65-26881E07B2D4}" type="datetime1">
               <a:rPr lang="en-US" smtClean="0"/>
-              <a:t>5/5/20</a:t>
+              <a:t>5/6/20</a:t>
             </a:fld>
             <a:endParaRPr lang="en-US" dirty="0"/>
           </a:p>
@@ -2107,7 +3169,7 @@
           <a:p>
             <a:fld id="{04C4989A-474C-40DE-95B9-011C28B71673}" type="datetime1">
               <a:rPr lang="en-US" smtClean="0"/>
-              <a:t>5/5/20</a:t>
+              <a:t>5/6/20</a:t>
             </a:fld>
             <a:endParaRPr lang="en-US" dirty="0"/>
           </a:p>
@@ -2230,7 +3292,7 @@
           <a:p>
             <a:fld id="{5DB4ED54-5B5E-4A04-93D3-5772E3CE3818}" type="datetime1">
               <a:rPr lang="en-US" smtClean="0"/>
-              <a:t>5/5/20</a:t>
+              <a:t>5/6/20</a:t>
             </a:fld>
             <a:endParaRPr lang="en-US" dirty="0"/>
           </a:p>
@@ -2325,7 +3387,7 @@
           <a:p>
             <a:fld id="{4EDE50D6-574B-40AF-946F-D52A04ADE379}" type="datetime1">
               <a:rPr lang="en-US" smtClean="0"/>
-              <a:t>5/5/20</a:t>
+              <a:t>5/6/20</a:t>
             </a:fld>
             <a:endParaRPr lang="en-US" dirty="0"/>
           </a:p>
@@ -2702,7 +3764,7 @@
           <a:p>
             <a:fld id="{D82884F1-FFEA-405F-9602-3DCA865EDA4E}" type="datetime1">
               <a:rPr lang="en-US" smtClean="0"/>
-              <a:t>5/5/20</a:t>
+              <a:t>5/6/20</a:t>
             </a:fld>
             <a:endParaRPr lang="en-US" dirty="0"/>
           </a:p>
@@ -2995,7 +4057,7 @@
           <a:p>
             <a:fld id="{7E18DB4A-8810-4A10-AD5C-D5E2C667F5B3}" type="datetime1">
               <a:rPr lang="en-US" smtClean="0"/>
-              <a:t>5/5/20</a:t>
+              <a:t>5/6/20</a:t>
             </a:fld>
             <a:endParaRPr lang="en-US" dirty="0"/>
           </a:p>
@@ -3210,7 +4272,7 @@
           <a:p>
             <a:fld id="{ED291B17-9318-49DB-B28B-6E5994AE9581}" type="datetime1">
               <a:rPr lang="en-US" smtClean="0"/>
-              <a:t>5/5/20</a:t>
+              <a:t>5/6/20</a:t>
             </a:fld>
             <a:endParaRPr lang="en-US" dirty="0"/>
           </a:p>
@@ -4197,7 +5259,22 @@
                   <a:srgbClr val="FFFFFF"/>
                 </a:solidFill>
               </a:rPr>
-              <a:t>Query Optimizer</a:t>
+              <a:t>SQL</a:t>
+            </a:r>
+            <a:br>
+              <a:rPr lang="en-US" dirty="0">
+                <a:solidFill>
+                  <a:srgbClr val="FFFFFF"/>
+                </a:solidFill>
+              </a:rPr>
+            </a:br>
+            <a:r>
+              <a:rPr lang="en-US" dirty="0">
+                <a:solidFill>
+                  <a:srgbClr val="FFFFFF"/>
+                </a:solidFill>
+              </a:rPr>
+              <a:t>EXPRESS</a:t>
             </a:r>
           </a:p>
         </p:txBody>
@@ -4502,6 +5579,569 @@
 </file>
 
 <file path=ppt/slides/slide4.xml><?xml version="1.0" encoding="utf-8"?>
+<p:sld xmlns:a="http://schemas.openxmlformats.org/drawingml/2006/main" xmlns:r="http://schemas.openxmlformats.org/officeDocument/2006/relationships" xmlns:p="http://schemas.openxmlformats.org/presentationml/2006/main">
+  <p:cSld>
+    <p:spTree>
+      <p:nvGrpSpPr>
+        <p:cNvPr id="1" name=""/>
+        <p:cNvGrpSpPr/>
+        <p:nvPr/>
+      </p:nvGrpSpPr>
+      <p:grpSpPr>
+        <a:xfrm>
+          <a:off x="0" y="0"/>
+          <a:ext cx="0" cy="0"/>
+          <a:chOff x="0" y="0"/>
+          <a:chExt cx="0" cy="0"/>
+        </a:xfrm>
+      </p:grpSpPr>
+      <p:sp>
+        <p:nvSpPr>
+          <p:cNvPr id="2" name="Title 1">
+            <a:extLst>
+              <a:ext uri="{FF2B5EF4-FFF2-40B4-BE49-F238E27FC236}">
+                <a16:creationId xmlns:a16="http://schemas.microsoft.com/office/drawing/2014/main" id="{645D69E6-F8AD-2B49-9A5D-2CA6E8742BA1}"/>
+              </a:ext>
+            </a:extLst>
+          </p:cNvPr>
+          <p:cNvSpPr>
+            <a:spLocks noGrp="1"/>
+          </p:cNvSpPr>
+          <p:nvPr>
+            <p:ph type="title"/>
+          </p:nvPr>
+        </p:nvSpPr>
+        <p:spPr>
+          <a:xfrm>
+            <a:off x="581192" y="702156"/>
+            <a:ext cx="11029616" cy="561868"/>
+          </a:xfrm>
+        </p:spPr>
+        <p:txBody>
+          <a:bodyPr/>
+          <a:lstStyle/>
+          <a:p>
+            <a:r>
+              <a:rPr lang="en-US" dirty="0"/>
+              <a:t>Example – 2 Pivoting - Queries</a:t>
+            </a:r>
+          </a:p>
+        </p:txBody>
+      </p:sp>
+      <p:sp>
+        <p:nvSpPr>
+          <p:cNvPr id="3" name="Content Placeholder 2">
+            <a:extLst>
+              <a:ext uri="{FF2B5EF4-FFF2-40B4-BE49-F238E27FC236}">
+                <a16:creationId xmlns:a16="http://schemas.microsoft.com/office/drawing/2014/main" id="{92C05093-F69E-FE44-97F1-F08289367E8F}"/>
+              </a:ext>
+            </a:extLst>
+          </p:cNvPr>
+          <p:cNvSpPr>
+            <a:spLocks noGrp="1"/>
+          </p:cNvSpPr>
+          <p:nvPr>
+            <p:ph idx="1"/>
+          </p:nvPr>
+        </p:nvSpPr>
+        <p:spPr>
+          <a:xfrm>
+            <a:off x="581193" y="2340864"/>
+            <a:ext cx="5514808" cy="3634486"/>
+          </a:xfrm>
+        </p:spPr>
+        <p:txBody>
+          <a:bodyPr>
+            <a:normAutofit/>
+          </a:bodyPr>
+          <a:lstStyle/>
+          <a:p>
+            <a:pPr marL="0" indent="0" algn="ctr">
+              <a:buNone/>
+            </a:pPr>
+            <a:r>
+              <a:rPr lang="en-US" sz="1600" b="1" u="sng" dirty="0">
+                <a:latin typeface="+mj-lt"/>
+              </a:rPr>
+              <a:t>MF</a:t>
+            </a:r>
+          </a:p>
+          <a:p>
+            <a:pPr marL="0" indent="0">
+              <a:buNone/>
+            </a:pPr>
+            <a:r>
+              <a:rPr lang="en-US" sz="1400" dirty="0">
+                <a:latin typeface="Courier" pitchFamily="2" charset="0"/>
+              </a:rPr>
+              <a:t>select cust,avg(x.sale),avg(y.sale),avg(z.sale)</a:t>
+            </a:r>
+            <a:br>
+              <a:rPr lang="en-US" sz="1400" dirty="0">
+                <a:latin typeface="Courier" pitchFamily="2" charset="0"/>
+              </a:rPr>
+            </a:br>
+            <a:r>
+              <a:rPr lang="en-US" sz="1400" dirty="0">
+                <a:latin typeface="Courier" pitchFamily="2" charset="0"/>
+              </a:rPr>
+              <a:t>from sales</a:t>
+            </a:r>
+            <a:br>
+              <a:rPr lang="en-US" sz="1400" dirty="0">
+                <a:latin typeface="Courier" pitchFamily="2" charset="0"/>
+              </a:rPr>
+            </a:br>
+            <a:r>
+              <a:rPr lang="en-US" sz="1400" dirty="0">
+                <a:latin typeface="Courier" pitchFamily="2" charset="0"/>
+              </a:rPr>
+              <a:t>where year=1997</a:t>
+            </a:r>
+            <a:br>
+              <a:rPr lang="en-US" sz="1400" dirty="0">
+                <a:latin typeface="Courier" pitchFamily="2" charset="0"/>
+              </a:rPr>
+            </a:br>
+            <a:r>
+              <a:rPr lang="en-US" sz="1400" dirty="0">
+                <a:latin typeface="Courier" pitchFamily="2" charset="0"/>
+              </a:rPr>
+              <a:t>group by cust; x,y,z</a:t>
+            </a:r>
+            <a:br>
+              <a:rPr lang="en-US" sz="1400" dirty="0">
+                <a:latin typeface="Courier" pitchFamily="2" charset="0"/>
+              </a:rPr>
+            </a:br>
+            <a:r>
+              <a:rPr lang="en-US" sz="1400" dirty="0">
+                <a:latin typeface="Courier" pitchFamily="2" charset="0"/>
+              </a:rPr>
+              <a:t>such that x.state=“NY”,</a:t>
+            </a:r>
+            <a:br>
+              <a:rPr lang="en-US" sz="1400" dirty="0">
+                <a:latin typeface="Courier" pitchFamily="2" charset="0"/>
+              </a:rPr>
+            </a:br>
+            <a:r>
+              <a:rPr lang="en-US" sz="1400" dirty="0">
+                <a:latin typeface="Courier" pitchFamily="2" charset="0"/>
+              </a:rPr>
+              <a:t>			y.state=“CT”,</a:t>
+            </a:r>
+            <a:br>
+              <a:rPr lang="en-US" sz="1400" dirty="0">
+                <a:latin typeface="Courier" pitchFamily="2" charset="0"/>
+              </a:rPr>
+            </a:br>
+            <a:r>
+              <a:rPr lang="en-US" sz="1400" dirty="0">
+                <a:latin typeface="Courier" pitchFamily="2" charset="0"/>
+              </a:rPr>
+              <a:t>		     z.state=“NJ”</a:t>
+            </a:r>
+            <a:br>
+              <a:rPr lang="en-US" sz="1400" dirty="0">
+                <a:latin typeface="Courier" pitchFamily="2" charset="0"/>
+              </a:rPr>
+            </a:br>
+            <a:r>
+              <a:rPr lang="en-US" sz="1400" dirty="0">
+                <a:latin typeface="Courier" pitchFamily="2" charset="0"/>
+              </a:rPr>
+              <a:t>having avg(x.sale)&gt;avg(y.sale) and avg(x.sale)&gt;avg(z.sale)</a:t>
+            </a:r>
+          </a:p>
+        </p:txBody>
+      </p:sp>
+      <p:sp>
+        <p:nvSpPr>
+          <p:cNvPr id="4" name="Content Placeholder 2">
+            <a:extLst>
+              <a:ext uri="{FF2B5EF4-FFF2-40B4-BE49-F238E27FC236}">
+                <a16:creationId xmlns:a16="http://schemas.microsoft.com/office/drawing/2014/main" id="{76F8D06B-F20B-1446-88CB-3D7A3272C3C7}"/>
+              </a:ext>
+            </a:extLst>
+          </p:cNvPr>
+          <p:cNvSpPr txBox="1">
+            <a:spLocks/>
+          </p:cNvSpPr>
+          <p:nvPr/>
+        </p:nvSpPr>
+        <p:spPr>
+          <a:xfrm>
+            <a:off x="6096000" y="2197429"/>
+            <a:ext cx="5514808" cy="3634486"/>
+          </a:xfrm>
+          <a:prstGeom prst="rect">
+            <a:avLst/>
+          </a:prstGeom>
+        </p:spPr>
+        <p:txBody>
+          <a:bodyPr vert="horz" lIns="91440" tIns="45720" rIns="91440" bIns="45720" rtlCol="0" anchor="ctr">
+            <a:normAutofit/>
+          </a:bodyPr>
+          <a:lstStyle>
+            <a:lvl1pPr marL="306000" indent="-306000" algn="l" defTabSz="457200" rtl="0" eaLnBrk="1" latinLnBrk="0" hangingPunct="1">
+              <a:lnSpc>
+                <a:spcPct val="110000"/>
+              </a:lnSpc>
+              <a:spcBef>
+                <a:spcPct val="20000"/>
+              </a:spcBef>
+              <a:spcAft>
+                <a:spcPts val="600"/>
+              </a:spcAft>
+              <a:buClr>
+                <a:schemeClr val="accent1"/>
+              </a:buClr>
+              <a:buSzPct val="92000"/>
+              <a:buFont typeface="Wingdings 2" panose="05020102010507070707" pitchFamily="18" charset="2"/>
+              <a:buChar char=""/>
+              <a:defRPr sz="1700" kern="1200">
+                <a:solidFill>
+                  <a:schemeClr val="tx1">
+                    <a:lumMod val="75000"/>
+                    <a:lumOff val="25000"/>
+                  </a:schemeClr>
+                </a:solidFill>
+                <a:latin typeface="+mn-lt"/>
+                <a:ea typeface="+mn-ea"/>
+                <a:cs typeface="+mn-cs"/>
+              </a:defRPr>
+            </a:lvl1pPr>
+            <a:lvl2pPr marL="630000" indent="-306000" algn="l" defTabSz="457200" rtl="0" eaLnBrk="1" latinLnBrk="0" hangingPunct="1">
+              <a:spcBef>
+                <a:spcPct val="20000"/>
+              </a:spcBef>
+              <a:spcAft>
+                <a:spcPts val="600"/>
+              </a:spcAft>
+              <a:buClr>
+                <a:schemeClr val="accent1"/>
+              </a:buClr>
+              <a:buSzPct val="92000"/>
+              <a:buFont typeface="Wingdings 2" panose="05020102010507070707" pitchFamily="18" charset="2"/>
+              <a:buChar char=""/>
+              <a:defRPr sz="1400" kern="1200">
+                <a:solidFill>
+                  <a:schemeClr val="tx1">
+                    <a:lumMod val="75000"/>
+                    <a:lumOff val="25000"/>
+                  </a:schemeClr>
+                </a:solidFill>
+                <a:latin typeface="+mn-lt"/>
+                <a:ea typeface="+mn-ea"/>
+                <a:cs typeface="+mn-cs"/>
+              </a:defRPr>
+            </a:lvl2pPr>
+            <a:lvl3pPr marL="900000" indent="-270000" algn="l" defTabSz="457200" rtl="0" eaLnBrk="1" latinLnBrk="0" hangingPunct="1">
+              <a:spcBef>
+                <a:spcPct val="20000"/>
+              </a:spcBef>
+              <a:spcAft>
+                <a:spcPts val="600"/>
+              </a:spcAft>
+              <a:buClr>
+                <a:schemeClr val="accent1"/>
+              </a:buClr>
+              <a:buSzPct val="92000"/>
+              <a:buFont typeface="Wingdings 2" panose="05020102010507070707" pitchFamily="18" charset="2"/>
+              <a:buChar char=""/>
+              <a:defRPr sz="1300" kern="1200">
+                <a:solidFill>
+                  <a:schemeClr val="tx1">
+                    <a:lumMod val="75000"/>
+                    <a:lumOff val="25000"/>
+                  </a:schemeClr>
+                </a:solidFill>
+                <a:latin typeface="+mn-lt"/>
+                <a:ea typeface="+mn-ea"/>
+                <a:cs typeface="+mn-cs"/>
+              </a:defRPr>
+            </a:lvl3pPr>
+            <a:lvl4pPr marL="1242000" indent="-234000" algn="l" defTabSz="457200" rtl="0" eaLnBrk="1" latinLnBrk="0" hangingPunct="1">
+              <a:spcBef>
+                <a:spcPct val="20000"/>
+              </a:spcBef>
+              <a:spcAft>
+                <a:spcPts val="600"/>
+              </a:spcAft>
+              <a:buClr>
+                <a:schemeClr val="accent1"/>
+              </a:buClr>
+              <a:buSzPct val="92000"/>
+              <a:buFont typeface="Wingdings 2" panose="05020102010507070707" pitchFamily="18" charset="2"/>
+              <a:buChar char=""/>
+              <a:defRPr sz="1100" kern="1200">
+                <a:solidFill>
+                  <a:schemeClr val="tx1">
+                    <a:lumMod val="75000"/>
+                    <a:lumOff val="25000"/>
+                  </a:schemeClr>
+                </a:solidFill>
+                <a:latin typeface="+mn-lt"/>
+                <a:ea typeface="+mn-ea"/>
+                <a:cs typeface="+mn-cs"/>
+              </a:defRPr>
+            </a:lvl4pPr>
+            <a:lvl5pPr marL="1602000" indent="-234000" algn="l" defTabSz="457200" rtl="0" eaLnBrk="1" latinLnBrk="0" hangingPunct="1">
+              <a:spcBef>
+                <a:spcPct val="20000"/>
+              </a:spcBef>
+              <a:spcAft>
+                <a:spcPts val="600"/>
+              </a:spcAft>
+              <a:buClr>
+                <a:schemeClr val="accent1"/>
+              </a:buClr>
+              <a:buSzPct val="92000"/>
+              <a:buFont typeface="Wingdings 2" panose="05020102010507070707" pitchFamily="18" charset="2"/>
+              <a:buChar char=""/>
+              <a:defRPr sz="1100" kern="1200">
+                <a:solidFill>
+                  <a:schemeClr val="tx1">
+                    <a:lumMod val="75000"/>
+                    <a:lumOff val="25000"/>
+                  </a:schemeClr>
+                </a:solidFill>
+                <a:latin typeface="+mn-lt"/>
+                <a:ea typeface="+mn-ea"/>
+                <a:cs typeface="+mn-cs"/>
+              </a:defRPr>
+            </a:lvl5pPr>
+            <a:lvl6pPr marL="1900000" indent="-228600" algn="l" defTabSz="457200" rtl="0" eaLnBrk="1" latinLnBrk="0" hangingPunct="1">
+              <a:spcBef>
+                <a:spcPct val="20000"/>
+              </a:spcBef>
+              <a:spcAft>
+                <a:spcPts val="600"/>
+              </a:spcAft>
+              <a:buClr>
+                <a:schemeClr val="accent2"/>
+              </a:buClr>
+              <a:buSzPct val="92000"/>
+              <a:buFont typeface="Wingdings 2" panose="05020102010507070707" pitchFamily="18" charset="2"/>
+              <a:buChar char=""/>
+              <a:defRPr sz="1200" kern="1200">
+                <a:solidFill>
+                  <a:schemeClr val="tx2"/>
+                </a:solidFill>
+                <a:latin typeface="+mn-lt"/>
+                <a:ea typeface="+mn-ea"/>
+                <a:cs typeface="+mn-cs"/>
+              </a:defRPr>
+            </a:lvl6pPr>
+            <a:lvl7pPr marL="2200000" indent="-228600" algn="l" defTabSz="457200" rtl="0" eaLnBrk="1" latinLnBrk="0" hangingPunct="1">
+              <a:spcBef>
+                <a:spcPct val="20000"/>
+              </a:spcBef>
+              <a:spcAft>
+                <a:spcPts val="600"/>
+              </a:spcAft>
+              <a:buClr>
+                <a:schemeClr val="accent2"/>
+              </a:buClr>
+              <a:buSzPct val="92000"/>
+              <a:buFont typeface="Wingdings 2" panose="05020102010507070707" pitchFamily="18" charset="2"/>
+              <a:buChar char=""/>
+              <a:defRPr sz="1200" kern="1200">
+                <a:solidFill>
+                  <a:schemeClr val="tx2"/>
+                </a:solidFill>
+                <a:latin typeface="+mn-lt"/>
+                <a:ea typeface="+mn-ea"/>
+                <a:cs typeface="+mn-cs"/>
+              </a:defRPr>
+            </a:lvl7pPr>
+            <a:lvl8pPr marL="2500000" indent="-228600" algn="l" defTabSz="457200" rtl="0" eaLnBrk="1" latinLnBrk="0" hangingPunct="1">
+              <a:spcBef>
+                <a:spcPct val="20000"/>
+              </a:spcBef>
+              <a:spcAft>
+                <a:spcPts val="600"/>
+              </a:spcAft>
+              <a:buClr>
+                <a:schemeClr val="accent2"/>
+              </a:buClr>
+              <a:buSzPct val="92000"/>
+              <a:buFont typeface="Wingdings 2" panose="05020102010507070707" pitchFamily="18" charset="2"/>
+              <a:buChar char=""/>
+              <a:defRPr sz="1200" kern="1200">
+                <a:solidFill>
+                  <a:schemeClr val="tx2"/>
+                </a:solidFill>
+                <a:latin typeface="+mn-lt"/>
+                <a:ea typeface="+mn-ea"/>
+                <a:cs typeface="+mn-cs"/>
+              </a:defRPr>
+            </a:lvl8pPr>
+            <a:lvl9pPr marL="2800000" indent="-228600" algn="l" defTabSz="457200" rtl="0" eaLnBrk="1" latinLnBrk="0" hangingPunct="1">
+              <a:spcBef>
+                <a:spcPct val="20000"/>
+              </a:spcBef>
+              <a:spcAft>
+                <a:spcPts val="600"/>
+              </a:spcAft>
+              <a:buClr>
+                <a:schemeClr val="accent2"/>
+              </a:buClr>
+              <a:buSzPct val="92000"/>
+              <a:buFont typeface="Wingdings 2" panose="05020102010507070707" pitchFamily="18" charset="2"/>
+              <a:buChar char=""/>
+              <a:defRPr sz="1200" kern="1200">
+                <a:solidFill>
+                  <a:schemeClr val="tx2"/>
+                </a:solidFill>
+                <a:latin typeface="+mn-lt"/>
+                <a:ea typeface="+mn-ea"/>
+                <a:cs typeface="+mn-cs"/>
+              </a:defRPr>
+            </a:lvl9pPr>
+          </a:lstStyle>
+          <a:p>
+            <a:pPr marL="0" indent="0" algn="ctr">
+              <a:buNone/>
+            </a:pPr>
+            <a:r>
+              <a:rPr lang="en-US" sz="1600" b="1" u="sng" dirty="0">
+                <a:latin typeface="+mj-lt"/>
+              </a:rPr>
+              <a:t>TRADITIONAL SQL</a:t>
+            </a:r>
+          </a:p>
+          <a:p>
+            <a:pPr marL="0" indent="0">
+              <a:buNone/>
+            </a:pPr>
+            <a:r>
+              <a:rPr lang="en-US" sz="1200" dirty="0">
+                <a:latin typeface="Courier" pitchFamily="2" charset="0"/>
+              </a:rPr>
+              <a:t>with </a:t>
+            </a:r>
+          </a:p>
+          <a:p>
+            <a:pPr marL="0" indent="0">
+              <a:buNone/>
+            </a:pPr>
+            <a:r>
+              <a:rPr lang="en-US" sz="1200" dirty="0">
+                <a:latin typeface="Courier" pitchFamily="2" charset="0"/>
+              </a:rPr>
+              <a:t>t1 as (select cust, avg(quant) as ny from sales where state = 'NY' group by cust ),</a:t>
+            </a:r>
+          </a:p>
+          <a:p>
+            <a:pPr marL="0" indent="0">
+              <a:buNone/>
+            </a:pPr>
+            <a:r>
+              <a:rPr lang="en-US" sz="1200" dirty="0">
+                <a:latin typeface="Courier" pitchFamily="2" charset="0"/>
+              </a:rPr>
+              <a:t>t2 as (select cust, avg(quant) as nj from sales where state = 'NJ' group by cust ),</a:t>
+            </a:r>
+          </a:p>
+          <a:p>
+            <a:pPr marL="0" indent="0">
+              <a:buNone/>
+            </a:pPr>
+            <a:r>
+              <a:rPr lang="en-US" sz="1200" dirty="0">
+                <a:latin typeface="Courier" pitchFamily="2" charset="0"/>
+              </a:rPr>
+              <a:t>t3 as (select cust, avg(quant) as ct from sales where state = 'CT' group by cust )</a:t>
+            </a:r>
+          </a:p>
+          <a:p>
+            <a:pPr marL="0" indent="0">
+              <a:buNone/>
+            </a:pPr>
+            <a:r>
+              <a:rPr lang="en-US" sz="1200" dirty="0">
+                <a:latin typeface="Courier" pitchFamily="2" charset="0"/>
+              </a:rPr>
+              <a:t>select t1.cust, ny, nj, ct</a:t>
+            </a:r>
+          </a:p>
+          <a:p>
+            <a:pPr marL="0" indent="0">
+              <a:buNone/>
+            </a:pPr>
+            <a:r>
+              <a:rPr lang="en-US" sz="1200" dirty="0">
+                <a:latin typeface="Courier" pitchFamily="2" charset="0"/>
+              </a:rPr>
+              <a:t>from t1, t2, t3</a:t>
+            </a:r>
+          </a:p>
+          <a:p>
+            <a:pPr marL="0" indent="0">
+              <a:buNone/>
+            </a:pPr>
+            <a:r>
+              <a:rPr lang="en-US" sz="1200" dirty="0">
+                <a:latin typeface="Courier" pitchFamily="2" charset="0"/>
+              </a:rPr>
+              <a:t>where t1.cust = t2.cust and t2.cust = t3.cust and ny &gt; nj and ny &gt; ct</a:t>
+            </a:r>
+          </a:p>
+        </p:txBody>
+      </p:sp>
+      <p:sp>
+        <p:nvSpPr>
+          <p:cNvPr id="5" name="TextBox 4">
+            <a:extLst>
+              <a:ext uri="{FF2B5EF4-FFF2-40B4-BE49-F238E27FC236}">
+                <a16:creationId xmlns:a16="http://schemas.microsoft.com/office/drawing/2014/main" id="{28E3EDA3-A45B-8547-8E67-1D25513C3241}"/>
+              </a:ext>
+            </a:extLst>
+          </p:cNvPr>
+          <p:cNvSpPr txBox="1"/>
+          <p:nvPr/>
+        </p:nvSpPr>
+        <p:spPr>
+          <a:xfrm>
+            <a:off x="581193" y="1389529"/>
+            <a:ext cx="11029616" cy="646331"/>
+          </a:xfrm>
+          <a:prstGeom prst="rect">
+            <a:avLst/>
+          </a:prstGeom>
+          <a:noFill/>
+        </p:spPr>
+        <p:txBody>
+          <a:bodyPr wrap="square" rtlCol="0">
+            <a:spAutoFit/>
+          </a:bodyPr>
+          <a:lstStyle/>
+          <a:p>
+            <a:r>
+              <a:rPr lang="en-US" dirty="0">
+                <a:latin typeface="+mj-lt"/>
+              </a:rPr>
+              <a:t>Find for each customer the average sale in “NY”, the average sale in “CT” and the average sale in “NJ”, if New York’s average is greater than the other two.</a:t>
+            </a:r>
+          </a:p>
+        </p:txBody>
+      </p:sp>
+    </p:spTree>
+    <p:extLst>
+      <p:ext uri="{BB962C8B-B14F-4D97-AF65-F5344CB8AC3E}">
+        <p14:creationId xmlns:p14="http://schemas.microsoft.com/office/powerpoint/2010/main" val="2121665936"/>
+      </p:ext>
+    </p:extLst>
+  </p:cSld>
+  <p:clrMapOvr>
+    <a:masterClrMapping/>
+  </p:clrMapOvr>
+</p:sld>
+</file>
+
+<file path=ppt/slides/slide5.xml><?xml version="1.0" encoding="utf-8"?>
 <p:sld xmlns:a="http://schemas.openxmlformats.org/drawingml/2006/main" xmlns:r="http://schemas.openxmlformats.org/officeDocument/2006/relationships" xmlns:p="http://schemas.openxmlformats.org/presentationml/2006/main">
   <p:cSld>
     <p:spTree>
@@ -5129,672 +6769,6 @@
     <p:extLst>
       <p:ext uri="{BB962C8B-B14F-4D97-AF65-F5344CB8AC3E}">
         <p14:creationId xmlns:p14="http://schemas.microsoft.com/office/powerpoint/2010/main" val="514412955"/>
-      </p:ext>
-    </p:extLst>
-  </p:cSld>
-  <p:clrMapOvr>
-    <a:masterClrMapping/>
-  </p:clrMapOvr>
-</p:sld>
-</file>
-
-<file path=ppt/slides/slide5.xml><?xml version="1.0" encoding="utf-8"?>
-<p:sld xmlns:a="http://schemas.openxmlformats.org/drawingml/2006/main" xmlns:r="http://schemas.openxmlformats.org/officeDocument/2006/relationships" xmlns:p="http://schemas.openxmlformats.org/presentationml/2006/main">
-  <p:cSld>
-    <p:spTree>
-      <p:nvGrpSpPr>
-        <p:cNvPr id="1" name=""/>
-        <p:cNvGrpSpPr/>
-        <p:nvPr/>
-      </p:nvGrpSpPr>
-      <p:grpSpPr>
-        <a:xfrm>
-          <a:off x="0" y="0"/>
-          <a:ext cx="0" cy="0"/>
-          <a:chOff x="0" y="0"/>
-          <a:chExt cx="0" cy="0"/>
-        </a:xfrm>
-      </p:grpSpPr>
-      <p:sp>
-        <p:nvSpPr>
-          <p:cNvPr id="2" name="Title 1">
-            <a:extLst>
-              <a:ext uri="{FF2B5EF4-FFF2-40B4-BE49-F238E27FC236}">
-                <a16:creationId xmlns:a16="http://schemas.microsoft.com/office/drawing/2014/main" id="{645D69E6-F8AD-2B49-9A5D-2CA6E8742BA1}"/>
-              </a:ext>
-            </a:extLst>
-          </p:cNvPr>
-          <p:cNvSpPr>
-            <a:spLocks noGrp="1"/>
-          </p:cNvSpPr>
-          <p:nvPr>
-            <p:ph type="title"/>
-          </p:nvPr>
-        </p:nvSpPr>
-        <p:spPr>
-          <a:xfrm>
-            <a:off x="581192" y="702156"/>
-            <a:ext cx="11029616" cy="561868"/>
-          </a:xfrm>
-        </p:spPr>
-        <p:txBody>
-          <a:bodyPr/>
-          <a:lstStyle/>
-          <a:p>
-            <a:r>
-              <a:rPr lang="en-US" dirty="0"/>
-              <a:t>Example – 2 Pivoting - Queries</a:t>
-            </a:r>
-          </a:p>
-        </p:txBody>
-      </p:sp>
-      <p:sp>
-        <p:nvSpPr>
-          <p:cNvPr id="3" name="Content Placeholder 2">
-            <a:extLst>
-              <a:ext uri="{FF2B5EF4-FFF2-40B4-BE49-F238E27FC236}">
-                <a16:creationId xmlns:a16="http://schemas.microsoft.com/office/drawing/2014/main" id="{92C05093-F69E-FE44-97F1-F08289367E8F}"/>
-              </a:ext>
-            </a:extLst>
-          </p:cNvPr>
-          <p:cNvSpPr>
-            <a:spLocks noGrp="1"/>
-          </p:cNvSpPr>
-          <p:nvPr>
-            <p:ph idx="1"/>
-          </p:nvPr>
-        </p:nvSpPr>
-        <p:spPr>
-          <a:xfrm>
-            <a:off x="581193" y="2340864"/>
-            <a:ext cx="5514808" cy="3634486"/>
-          </a:xfrm>
-        </p:spPr>
-        <p:txBody>
-          <a:bodyPr>
-            <a:normAutofit/>
-          </a:bodyPr>
-          <a:lstStyle/>
-          <a:p>
-            <a:pPr marL="0" indent="0" algn="ctr">
-              <a:buNone/>
-            </a:pPr>
-            <a:r>
-              <a:rPr lang="en-US" sz="1600" b="1" u="sng" dirty="0">
-                <a:latin typeface="+mj-lt"/>
-              </a:rPr>
-              <a:t>EMF</a:t>
-            </a:r>
-          </a:p>
-          <a:p>
-            <a:pPr marL="0" indent="0">
-              <a:buNone/>
-            </a:pPr>
-            <a:r>
-              <a:rPr lang="en-US" sz="1400" dirty="0">
-                <a:latin typeface="Courier" pitchFamily="2" charset="0"/>
-              </a:rPr>
-              <a:t>select cust,avg(x.sale),avg(y.sale),avg(z.sale)</a:t>
-            </a:r>
-            <a:br>
-              <a:rPr lang="en-US" sz="1400" dirty="0">
-                <a:latin typeface="Courier" pitchFamily="2" charset="0"/>
-              </a:rPr>
-            </a:br>
-            <a:r>
-              <a:rPr lang="en-US" sz="1400" dirty="0">
-                <a:latin typeface="Courier" pitchFamily="2" charset="0"/>
-              </a:rPr>
-              <a:t>from sales</a:t>
-            </a:r>
-            <a:br>
-              <a:rPr lang="en-US" sz="1400" dirty="0">
-                <a:latin typeface="Courier" pitchFamily="2" charset="0"/>
-              </a:rPr>
-            </a:br>
-            <a:r>
-              <a:rPr lang="en-US" sz="1400" dirty="0">
-                <a:latin typeface="Courier" pitchFamily="2" charset="0"/>
-              </a:rPr>
-              <a:t>where year=1997</a:t>
-            </a:r>
-            <a:br>
-              <a:rPr lang="en-US" sz="1400" dirty="0">
-                <a:latin typeface="Courier" pitchFamily="2" charset="0"/>
-              </a:rPr>
-            </a:br>
-            <a:r>
-              <a:rPr lang="en-US" sz="1400" dirty="0">
-                <a:latin typeface="Courier" pitchFamily="2" charset="0"/>
-              </a:rPr>
-              <a:t>group by cust; x,y,z</a:t>
-            </a:r>
-            <a:br>
-              <a:rPr lang="en-US" sz="1400" dirty="0">
-                <a:latin typeface="Courier" pitchFamily="2" charset="0"/>
-              </a:rPr>
-            </a:br>
-            <a:r>
-              <a:rPr lang="en-US" sz="1400" dirty="0">
-                <a:latin typeface="Courier" pitchFamily="2" charset="0"/>
-              </a:rPr>
-              <a:t>such that x.cust=cust and x.state=“NY”,</a:t>
-            </a:r>
-            <a:br>
-              <a:rPr lang="en-US" sz="1400" dirty="0">
-                <a:latin typeface="Courier" pitchFamily="2" charset="0"/>
-              </a:rPr>
-            </a:br>
-            <a:r>
-              <a:rPr lang="en-US" sz="1400" dirty="0">
-                <a:latin typeface="Courier" pitchFamily="2" charset="0"/>
-              </a:rPr>
-              <a:t>		y.cust=cust and y.state=“CT”,</a:t>
-            </a:r>
-            <a:br>
-              <a:rPr lang="en-US" sz="1400" dirty="0">
-                <a:latin typeface="Courier" pitchFamily="2" charset="0"/>
-              </a:rPr>
-            </a:br>
-            <a:r>
-              <a:rPr lang="en-US" sz="1400" dirty="0">
-                <a:latin typeface="Courier" pitchFamily="2" charset="0"/>
-              </a:rPr>
-              <a:t>		z.cust=cust and z.state=“NJ”</a:t>
-            </a:r>
-            <a:br>
-              <a:rPr lang="en-US" sz="1400" dirty="0">
-                <a:latin typeface="Courier" pitchFamily="2" charset="0"/>
-              </a:rPr>
-            </a:br>
-            <a:r>
-              <a:rPr lang="en-US" sz="1400" dirty="0">
-                <a:latin typeface="Courier" pitchFamily="2" charset="0"/>
-              </a:rPr>
-              <a:t>having avg(x.sale)&gt;avg(y.sale) and avg(x.sale)&gt;avg(z.sale)</a:t>
-            </a:r>
-          </a:p>
-        </p:txBody>
-      </p:sp>
-      <p:sp>
-        <p:nvSpPr>
-          <p:cNvPr id="4" name="Content Placeholder 2">
-            <a:extLst>
-              <a:ext uri="{FF2B5EF4-FFF2-40B4-BE49-F238E27FC236}">
-                <a16:creationId xmlns:a16="http://schemas.microsoft.com/office/drawing/2014/main" id="{76F8D06B-F20B-1446-88CB-3D7A3272C3C7}"/>
-              </a:ext>
-            </a:extLst>
-          </p:cNvPr>
-          <p:cNvSpPr txBox="1">
-            <a:spLocks/>
-          </p:cNvSpPr>
-          <p:nvPr/>
-        </p:nvSpPr>
-        <p:spPr>
-          <a:xfrm>
-            <a:off x="6096000" y="2197429"/>
-            <a:ext cx="5514808" cy="3634486"/>
-          </a:xfrm>
-          <a:prstGeom prst="rect">
-            <a:avLst/>
-          </a:prstGeom>
-        </p:spPr>
-        <p:txBody>
-          <a:bodyPr vert="horz" lIns="91440" tIns="45720" rIns="91440" bIns="45720" rtlCol="0" anchor="ctr">
-            <a:normAutofit/>
-          </a:bodyPr>
-          <a:lstStyle>
-            <a:lvl1pPr marL="306000" indent="-306000" algn="l" defTabSz="457200" rtl="0" eaLnBrk="1" latinLnBrk="0" hangingPunct="1">
-              <a:lnSpc>
-                <a:spcPct val="110000"/>
-              </a:lnSpc>
-              <a:spcBef>
-                <a:spcPct val="20000"/>
-              </a:spcBef>
-              <a:spcAft>
-                <a:spcPts val="600"/>
-              </a:spcAft>
-              <a:buClr>
-                <a:schemeClr val="accent1"/>
-              </a:buClr>
-              <a:buSzPct val="92000"/>
-              <a:buFont typeface="Wingdings 2" panose="05020102010507070707" pitchFamily="18" charset="2"/>
-              <a:buChar char=""/>
-              <a:defRPr sz="1700" kern="1200">
-                <a:solidFill>
-                  <a:schemeClr val="tx1">
-                    <a:lumMod val="75000"/>
-                    <a:lumOff val="25000"/>
-                  </a:schemeClr>
-                </a:solidFill>
-                <a:latin typeface="+mn-lt"/>
-                <a:ea typeface="+mn-ea"/>
-                <a:cs typeface="+mn-cs"/>
-              </a:defRPr>
-            </a:lvl1pPr>
-            <a:lvl2pPr marL="630000" indent="-306000" algn="l" defTabSz="457200" rtl="0" eaLnBrk="1" latinLnBrk="0" hangingPunct="1">
-              <a:spcBef>
-                <a:spcPct val="20000"/>
-              </a:spcBef>
-              <a:spcAft>
-                <a:spcPts val="600"/>
-              </a:spcAft>
-              <a:buClr>
-                <a:schemeClr val="accent1"/>
-              </a:buClr>
-              <a:buSzPct val="92000"/>
-              <a:buFont typeface="Wingdings 2" panose="05020102010507070707" pitchFamily="18" charset="2"/>
-              <a:buChar char=""/>
-              <a:defRPr sz="1400" kern="1200">
-                <a:solidFill>
-                  <a:schemeClr val="tx1">
-                    <a:lumMod val="75000"/>
-                    <a:lumOff val="25000"/>
-                  </a:schemeClr>
-                </a:solidFill>
-                <a:latin typeface="+mn-lt"/>
-                <a:ea typeface="+mn-ea"/>
-                <a:cs typeface="+mn-cs"/>
-              </a:defRPr>
-            </a:lvl2pPr>
-            <a:lvl3pPr marL="900000" indent="-270000" algn="l" defTabSz="457200" rtl="0" eaLnBrk="1" latinLnBrk="0" hangingPunct="1">
-              <a:spcBef>
-                <a:spcPct val="20000"/>
-              </a:spcBef>
-              <a:spcAft>
-                <a:spcPts val="600"/>
-              </a:spcAft>
-              <a:buClr>
-                <a:schemeClr val="accent1"/>
-              </a:buClr>
-              <a:buSzPct val="92000"/>
-              <a:buFont typeface="Wingdings 2" panose="05020102010507070707" pitchFamily="18" charset="2"/>
-              <a:buChar char=""/>
-              <a:defRPr sz="1300" kern="1200">
-                <a:solidFill>
-                  <a:schemeClr val="tx1">
-                    <a:lumMod val="75000"/>
-                    <a:lumOff val="25000"/>
-                  </a:schemeClr>
-                </a:solidFill>
-                <a:latin typeface="+mn-lt"/>
-                <a:ea typeface="+mn-ea"/>
-                <a:cs typeface="+mn-cs"/>
-              </a:defRPr>
-            </a:lvl3pPr>
-            <a:lvl4pPr marL="1242000" indent="-234000" algn="l" defTabSz="457200" rtl="0" eaLnBrk="1" latinLnBrk="0" hangingPunct="1">
-              <a:spcBef>
-                <a:spcPct val="20000"/>
-              </a:spcBef>
-              <a:spcAft>
-                <a:spcPts val="600"/>
-              </a:spcAft>
-              <a:buClr>
-                <a:schemeClr val="accent1"/>
-              </a:buClr>
-              <a:buSzPct val="92000"/>
-              <a:buFont typeface="Wingdings 2" panose="05020102010507070707" pitchFamily="18" charset="2"/>
-              <a:buChar char=""/>
-              <a:defRPr sz="1100" kern="1200">
-                <a:solidFill>
-                  <a:schemeClr val="tx1">
-                    <a:lumMod val="75000"/>
-                    <a:lumOff val="25000"/>
-                  </a:schemeClr>
-                </a:solidFill>
-                <a:latin typeface="+mn-lt"/>
-                <a:ea typeface="+mn-ea"/>
-                <a:cs typeface="+mn-cs"/>
-              </a:defRPr>
-            </a:lvl4pPr>
-            <a:lvl5pPr marL="1602000" indent="-234000" algn="l" defTabSz="457200" rtl="0" eaLnBrk="1" latinLnBrk="0" hangingPunct="1">
-              <a:spcBef>
-                <a:spcPct val="20000"/>
-              </a:spcBef>
-              <a:spcAft>
-                <a:spcPts val="600"/>
-              </a:spcAft>
-              <a:buClr>
-                <a:schemeClr val="accent1"/>
-              </a:buClr>
-              <a:buSzPct val="92000"/>
-              <a:buFont typeface="Wingdings 2" panose="05020102010507070707" pitchFamily="18" charset="2"/>
-              <a:buChar char=""/>
-              <a:defRPr sz="1100" kern="1200">
-                <a:solidFill>
-                  <a:schemeClr val="tx1">
-                    <a:lumMod val="75000"/>
-                    <a:lumOff val="25000"/>
-                  </a:schemeClr>
-                </a:solidFill>
-                <a:latin typeface="+mn-lt"/>
-                <a:ea typeface="+mn-ea"/>
-                <a:cs typeface="+mn-cs"/>
-              </a:defRPr>
-            </a:lvl5pPr>
-            <a:lvl6pPr marL="1900000" indent="-228600" algn="l" defTabSz="457200" rtl="0" eaLnBrk="1" latinLnBrk="0" hangingPunct="1">
-              <a:spcBef>
-                <a:spcPct val="20000"/>
-              </a:spcBef>
-              <a:spcAft>
-                <a:spcPts val="600"/>
-              </a:spcAft>
-              <a:buClr>
-                <a:schemeClr val="accent2"/>
-              </a:buClr>
-              <a:buSzPct val="92000"/>
-              <a:buFont typeface="Wingdings 2" panose="05020102010507070707" pitchFamily="18" charset="2"/>
-              <a:buChar char=""/>
-              <a:defRPr sz="1200" kern="1200">
-                <a:solidFill>
-                  <a:schemeClr val="tx2"/>
-                </a:solidFill>
-                <a:latin typeface="+mn-lt"/>
-                <a:ea typeface="+mn-ea"/>
-                <a:cs typeface="+mn-cs"/>
-              </a:defRPr>
-            </a:lvl6pPr>
-            <a:lvl7pPr marL="2200000" indent="-228600" algn="l" defTabSz="457200" rtl="0" eaLnBrk="1" latinLnBrk="0" hangingPunct="1">
-              <a:spcBef>
-                <a:spcPct val="20000"/>
-              </a:spcBef>
-              <a:spcAft>
-                <a:spcPts val="600"/>
-              </a:spcAft>
-              <a:buClr>
-                <a:schemeClr val="accent2"/>
-              </a:buClr>
-              <a:buSzPct val="92000"/>
-              <a:buFont typeface="Wingdings 2" panose="05020102010507070707" pitchFamily="18" charset="2"/>
-              <a:buChar char=""/>
-              <a:defRPr sz="1200" kern="1200">
-                <a:solidFill>
-                  <a:schemeClr val="tx2"/>
-                </a:solidFill>
-                <a:latin typeface="+mn-lt"/>
-                <a:ea typeface="+mn-ea"/>
-                <a:cs typeface="+mn-cs"/>
-              </a:defRPr>
-            </a:lvl7pPr>
-            <a:lvl8pPr marL="2500000" indent="-228600" algn="l" defTabSz="457200" rtl="0" eaLnBrk="1" latinLnBrk="0" hangingPunct="1">
-              <a:spcBef>
-                <a:spcPct val="20000"/>
-              </a:spcBef>
-              <a:spcAft>
-                <a:spcPts val="600"/>
-              </a:spcAft>
-              <a:buClr>
-                <a:schemeClr val="accent2"/>
-              </a:buClr>
-              <a:buSzPct val="92000"/>
-              <a:buFont typeface="Wingdings 2" panose="05020102010507070707" pitchFamily="18" charset="2"/>
-              <a:buChar char=""/>
-              <a:defRPr sz="1200" kern="1200">
-                <a:solidFill>
-                  <a:schemeClr val="tx2"/>
-                </a:solidFill>
-                <a:latin typeface="+mn-lt"/>
-                <a:ea typeface="+mn-ea"/>
-                <a:cs typeface="+mn-cs"/>
-              </a:defRPr>
-            </a:lvl8pPr>
-            <a:lvl9pPr marL="2800000" indent="-228600" algn="l" defTabSz="457200" rtl="0" eaLnBrk="1" latinLnBrk="0" hangingPunct="1">
-              <a:spcBef>
-                <a:spcPct val="20000"/>
-              </a:spcBef>
-              <a:spcAft>
-                <a:spcPts val="600"/>
-              </a:spcAft>
-              <a:buClr>
-                <a:schemeClr val="accent2"/>
-              </a:buClr>
-              <a:buSzPct val="92000"/>
-              <a:buFont typeface="Wingdings 2" panose="05020102010507070707" pitchFamily="18" charset="2"/>
-              <a:buChar char=""/>
-              <a:defRPr sz="1200" kern="1200">
-                <a:solidFill>
-                  <a:schemeClr val="tx2"/>
-                </a:solidFill>
-                <a:latin typeface="+mn-lt"/>
-                <a:ea typeface="+mn-ea"/>
-                <a:cs typeface="+mn-cs"/>
-              </a:defRPr>
-            </a:lvl9pPr>
-          </a:lstStyle>
-          <a:p>
-            <a:pPr marL="0" indent="0">
-              <a:buNone/>
-            </a:pPr>
-            <a:r>
-              <a:rPr lang="en-US" sz="1200" dirty="0">
-                <a:latin typeface="Courier" pitchFamily="2" charset="0"/>
-              </a:rPr>
-              <a:t>with </a:t>
-            </a:r>
-          </a:p>
-          <a:p>
-            <a:pPr marL="0" indent="0">
-              <a:buNone/>
-            </a:pPr>
-            <a:r>
-              <a:rPr lang="en-US" sz="1200" dirty="0">
-                <a:latin typeface="Courier" pitchFamily="2" charset="0"/>
-              </a:rPr>
-              <a:t>t1 as (select cust, avg(quant) as </a:t>
-            </a:r>
-            <a:r>
-              <a:rPr lang="en-US" sz="1200" dirty="0" err="1">
-                <a:latin typeface="Courier" pitchFamily="2" charset="0"/>
-              </a:rPr>
-              <a:t>ny</a:t>
-            </a:r>
-            <a:r>
-              <a:rPr lang="en-US" sz="1200" dirty="0">
-                <a:latin typeface="Courier" pitchFamily="2" charset="0"/>
-              </a:rPr>
-              <a:t> from sales where state = 'NY' group by cust ),</a:t>
-            </a:r>
-          </a:p>
-          <a:p>
-            <a:pPr marL="0" indent="0">
-              <a:buNone/>
-            </a:pPr>
-            <a:r>
-              <a:rPr lang="en-US" sz="1200" dirty="0">
-                <a:latin typeface="Courier" pitchFamily="2" charset="0"/>
-              </a:rPr>
-              <a:t>t2 as (select cust, avg(quant) as </a:t>
-            </a:r>
-            <a:r>
-              <a:rPr lang="en-US" sz="1200" dirty="0" err="1">
-                <a:latin typeface="Courier" pitchFamily="2" charset="0"/>
-              </a:rPr>
-              <a:t>nj</a:t>
-            </a:r>
-            <a:r>
-              <a:rPr lang="en-US" sz="1200" dirty="0">
-                <a:latin typeface="Courier" pitchFamily="2" charset="0"/>
-              </a:rPr>
-              <a:t> from sales where state = 'NJ' group by cust ),</a:t>
-            </a:r>
-          </a:p>
-          <a:p>
-            <a:pPr marL="0" indent="0">
-              <a:buNone/>
-            </a:pPr>
-            <a:r>
-              <a:rPr lang="en-US" sz="1200" dirty="0">
-                <a:latin typeface="Courier" pitchFamily="2" charset="0"/>
-              </a:rPr>
-              <a:t>t3 as (select cust, avg(quant) as </a:t>
-            </a:r>
-            <a:r>
-              <a:rPr lang="en-US" sz="1200" dirty="0" err="1">
-                <a:latin typeface="Courier" pitchFamily="2" charset="0"/>
-              </a:rPr>
-              <a:t>ct</a:t>
-            </a:r>
-            <a:r>
-              <a:rPr lang="en-US" sz="1200" dirty="0">
-                <a:latin typeface="Courier" pitchFamily="2" charset="0"/>
-              </a:rPr>
-              <a:t> from sales where state = 'CT' group by cust )</a:t>
-            </a:r>
-          </a:p>
-          <a:p>
-            <a:pPr marL="0" indent="0">
-              <a:buNone/>
-            </a:pPr>
-            <a:r>
-              <a:rPr lang="en-US" sz="1200" dirty="0">
-                <a:latin typeface="Courier" pitchFamily="2" charset="0"/>
-              </a:rPr>
-              <a:t>select t1.cust, </a:t>
-            </a:r>
-            <a:r>
-              <a:rPr lang="en-US" sz="1200" dirty="0" err="1">
-                <a:latin typeface="Courier" pitchFamily="2" charset="0"/>
-              </a:rPr>
-              <a:t>ny</a:t>
-            </a:r>
-            <a:r>
-              <a:rPr lang="en-US" sz="1200" dirty="0">
-                <a:latin typeface="Courier" pitchFamily="2" charset="0"/>
-              </a:rPr>
-              <a:t>, </a:t>
-            </a:r>
-            <a:r>
-              <a:rPr lang="en-US" sz="1200" dirty="0" err="1">
-                <a:latin typeface="Courier" pitchFamily="2" charset="0"/>
-              </a:rPr>
-              <a:t>nj</a:t>
-            </a:r>
-            <a:r>
-              <a:rPr lang="en-US" sz="1200" dirty="0">
-                <a:latin typeface="Courier" pitchFamily="2" charset="0"/>
-              </a:rPr>
-              <a:t>, </a:t>
-            </a:r>
-            <a:r>
-              <a:rPr lang="en-US" sz="1200" dirty="0" err="1">
-                <a:latin typeface="Courier" pitchFamily="2" charset="0"/>
-              </a:rPr>
-              <a:t>ct</a:t>
-            </a:r>
-            <a:endParaRPr lang="en-US" sz="1200" dirty="0">
-              <a:latin typeface="Courier" pitchFamily="2" charset="0"/>
-            </a:endParaRPr>
-          </a:p>
-          <a:p>
-            <a:pPr marL="0" indent="0">
-              <a:buNone/>
-            </a:pPr>
-            <a:r>
-              <a:rPr lang="en-US" sz="1200" dirty="0">
-                <a:latin typeface="Courier" pitchFamily="2" charset="0"/>
-              </a:rPr>
-              <a:t>from t1, t2, t3</a:t>
-            </a:r>
-          </a:p>
-          <a:p>
-            <a:pPr marL="0" indent="0">
-              <a:buNone/>
-            </a:pPr>
-            <a:r>
-              <a:rPr lang="en-US" sz="1200" dirty="0">
-                <a:latin typeface="Courier" pitchFamily="2" charset="0"/>
-              </a:rPr>
-              <a:t>where t1.cust = t2.cust and t2.cust = t3.cust and </a:t>
-            </a:r>
-            <a:r>
-              <a:rPr lang="en-US" sz="1200" dirty="0" err="1">
-                <a:latin typeface="Courier" pitchFamily="2" charset="0"/>
-              </a:rPr>
-              <a:t>ny</a:t>
-            </a:r>
-            <a:r>
-              <a:rPr lang="en-US" sz="1200" dirty="0">
-                <a:latin typeface="Courier" pitchFamily="2" charset="0"/>
-              </a:rPr>
-              <a:t> &gt; </a:t>
-            </a:r>
-            <a:r>
-              <a:rPr lang="en-US" sz="1200" dirty="0" err="1">
-                <a:latin typeface="Courier" pitchFamily="2" charset="0"/>
-              </a:rPr>
-              <a:t>nj</a:t>
-            </a:r>
-            <a:r>
-              <a:rPr lang="en-US" sz="1200" dirty="0">
-                <a:latin typeface="Courier" pitchFamily="2" charset="0"/>
-              </a:rPr>
-              <a:t> and </a:t>
-            </a:r>
-            <a:r>
-              <a:rPr lang="en-US" sz="1200" dirty="0" err="1">
-                <a:latin typeface="Courier" pitchFamily="2" charset="0"/>
-              </a:rPr>
-              <a:t>ny</a:t>
-            </a:r>
-            <a:r>
-              <a:rPr lang="en-US" sz="1200" dirty="0">
-                <a:latin typeface="Courier" pitchFamily="2" charset="0"/>
-              </a:rPr>
-              <a:t> &gt; </a:t>
-            </a:r>
-            <a:r>
-              <a:rPr lang="en-US" sz="1200" dirty="0" err="1">
-                <a:latin typeface="Courier" pitchFamily="2" charset="0"/>
-              </a:rPr>
-              <a:t>ct</a:t>
-            </a:r>
-            <a:endParaRPr lang="en-US" sz="1200" dirty="0">
-              <a:latin typeface="Courier" pitchFamily="2" charset="0"/>
-            </a:endParaRPr>
-          </a:p>
-        </p:txBody>
-      </p:sp>
-      <p:sp>
-        <p:nvSpPr>
-          <p:cNvPr id="5" name="TextBox 4">
-            <a:extLst>
-              <a:ext uri="{FF2B5EF4-FFF2-40B4-BE49-F238E27FC236}">
-                <a16:creationId xmlns:a16="http://schemas.microsoft.com/office/drawing/2014/main" id="{28E3EDA3-A45B-8547-8E67-1D25513C3241}"/>
-              </a:ext>
-            </a:extLst>
-          </p:cNvPr>
-          <p:cNvSpPr txBox="1"/>
-          <p:nvPr/>
-        </p:nvSpPr>
-        <p:spPr>
-          <a:xfrm>
-            <a:off x="581193" y="1389529"/>
-            <a:ext cx="11029616" cy="646331"/>
-          </a:xfrm>
-          <a:prstGeom prst="rect">
-            <a:avLst/>
-          </a:prstGeom>
-          <a:noFill/>
-        </p:spPr>
-        <p:txBody>
-          <a:bodyPr wrap="square" rtlCol="0">
-            <a:spAutoFit/>
-          </a:bodyPr>
-          <a:lstStyle/>
-          <a:p>
-            <a:r>
-              <a:rPr lang="en-US" dirty="0">
-                <a:latin typeface="+mj-lt"/>
-              </a:rPr>
-              <a:t>Find for each customer the average sale in “NY”, the average sale in “CT” and the average sale in “NJ”, if New York’s average is greater than the other two.</a:t>
-            </a:r>
-          </a:p>
-        </p:txBody>
-      </p:sp>
-    </p:spTree>
-    <p:extLst>
-      <p:ext uri="{BB962C8B-B14F-4D97-AF65-F5344CB8AC3E}">
-        <p14:creationId xmlns:p14="http://schemas.microsoft.com/office/powerpoint/2010/main" val="2121665936"/>
       </p:ext>
     </p:extLst>
   </p:cSld>
@@ -7155,4 +8129,299 @@
     </a:ext>
   </a:extLst>
 </a:theme>
+</file>
+
+<file path=ppt/theme/theme2.xml><?xml version="1.0" encoding="utf-8"?>
+<a:theme xmlns:a="http://schemas.openxmlformats.org/drawingml/2006/main" name="Office Theme">
+  <a:themeElements>
+    <a:clrScheme name="Office">
+      <a:dk1>
+        <a:sysClr val="windowText" lastClr="000000"/>
+      </a:dk1>
+      <a:lt1>
+        <a:sysClr val="window" lastClr="FFFFFF"/>
+      </a:lt1>
+      <a:dk2>
+        <a:srgbClr val="44546A"/>
+      </a:dk2>
+      <a:lt2>
+        <a:srgbClr val="E7E6E6"/>
+      </a:lt2>
+      <a:accent1>
+        <a:srgbClr val="4472C4"/>
+      </a:accent1>
+      <a:accent2>
+        <a:srgbClr val="ED7D31"/>
+      </a:accent2>
+      <a:accent3>
+        <a:srgbClr val="A5A5A5"/>
+      </a:accent3>
+      <a:accent4>
+        <a:srgbClr val="FFC000"/>
+      </a:accent4>
+      <a:accent5>
+        <a:srgbClr val="5B9BD5"/>
+      </a:accent5>
+      <a:accent6>
+        <a:srgbClr val="70AD47"/>
+      </a:accent6>
+      <a:hlink>
+        <a:srgbClr val="0563C1"/>
+      </a:hlink>
+      <a:folHlink>
+        <a:srgbClr val="954F72"/>
+      </a:folHlink>
+    </a:clrScheme>
+    <a:fontScheme name="Office">
+      <a:majorFont>
+        <a:latin typeface="Calibri Light" panose="020F0302020204030204"/>
+        <a:ea typeface=""/>
+        <a:cs typeface=""/>
+        <a:font script="Jpan" typeface="游ゴシック Light"/>
+        <a:font script="Hang" typeface="맑은 고딕"/>
+        <a:font script="Hans" typeface="等线 Light"/>
+        <a:font script="Hant" typeface="新細明體"/>
+        <a:font script="Arab" typeface="Times New Roman"/>
+        <a:font script="Hebr" typeface="Times New Roman"/>
+        <a:font script="Thai" typeface="Angsana New"/>
+        <a:font script="Ethi" typeface="Nyala"/>
+        <a:font script="Beng" typeface="Vrinda"/>
+        <a:font script="Gujr" typeface="Shruti"/>
+        <a:font script="Khmr" typeface="MoolBoran"/>
+        <a:font script="Knda" typeface="Tunga"/>
+        <a:font script="Guru" typeface="Raavi"/>
+        <a:font script="Cans" typeface="Euphemia"/>
+        <a:font script="Cher" typeface="Plantagenet Cherokee"/>
+        <a:font script="Yiii" typeface="Microsoft Yi Baiti"/>
+        <a:font script="Tibt" typeface="Microsoft Himalaya"/>
+        <a:font script="Thaa" typeface="MV Boli"/>
+        <a:font script="Deva" typeface="Mangal"/>
+        <a:font script="Telu" typeface="Gautami"/>
+        <a:font script="Taml" typeface="Latha"/>
+        <a:font script="Syrc" typeface="Estrangelo Edessa"/>
+        <a:font script="Orya" typeface="Kalinga"/>
+        <a:font script="Mlym" typeface="Kartika"/>
+        <a:font script="Laoo" typeface="DokChampa"/>
+        <a:font script="Sinh" typeface="Iskoola Pota"/>
+        <a:font script="Mong" typeface="Mongolian Baiti"/>
+        <a:font script="Viet" typeface="Times New Roman"/>
+        <a:font script="Uigh" typeface="Microsoft Uighur"/>
+        <a:font script="Geor" typeface="Sylfaen"/>
+        <a:font script="Armn" typeface="Arial"/>
+        <a:font script="Bugi" typeface="Leelawadee UI"/>
+        <a:font script="Bopo" typeface="Microsoft JhengHei"/>
+        <a:font script="Java" typeface="Javanese Text"/>
+        <a:font script="Lisu" typeface="Segoe UI"/>
+        <a:font script="Mymr" typeface="Myanmar Text"/>
+        <a:font script="Nkoo" typeface="Ebrima"/>
+        <a:font script="Olck" typeface="Nirmala UI"/>
+        <a:font script="Osma" typeface="Ebrima"/>
+        <a:font script="Phag" typeface="Phagspa"/>
+        <a:font script="Syrn" typeface="Estrangelo Edessa"/>
+        <a:font script="Syrj" typeface="Estrangelo Edessa"/>
+        <a:font script="Syre" typeface="Estrangelo Edessa"/>
+        <a:font script="Sora" typeface="Nirmala UI"/>
+        <a:font script="Tale" typeface="Microsoft Tai Le"/>
+        <a:font script="Talu" typeface="Microsoft New Tai Lue"/>
+        <a:font script="Tfng" typeface="Ebrima"/>
+      </a:majorFont>
+      <a:minorFont>
+        <a:latin typeface="Calibri" panose="020F0502020204030204"/>
+        <a:ea typeface=""/>
+        <a:cs typeface=""/>
+        <a:font script="Jpan" typeface="游ゴシック"/>
+        <a:font script="Hang" typeface="맑은 고딕"/>
+        <a:font script="Hans" typeface="等线"/>
+        <a:font script="Hant" typeface="新細明體"/>
+        <a:font script="Arab" typeface="Arial"/>
+        <a:font script="Hebr" typeface="Arial"/>
+        <a:font script="Thai" typeface="Cordia New"/>
+        <a:font script="Ethi" typeface="Nyala"/>
+        <a:font script="Beng" typeface="Vrinda"/>
+        <a:font script="Gujr" typeface="Shruti"/>
+        <a:font script="Khmr" typeface="DaunPenh"/>
+        <a:font script="Knda" typeface="Tunga"/>
+        <a:font script="Guru" typeface="Raavi"/>
+        <a:font script="Cans" typeface="Euphemia"/>
+        <a:font script="Cher" typeface="Plantagenet Cherokee"/>
+        <a:font script="Yiii" typeface="Microsoft Yi Baiti"/>
+        <a:font script="Tibt" typeface="Microsoft Himalaya"/>
+        <a:font script="Thaa" typeface="MV Boli"/>
+        <a:font script="Deva" typeface="Mangal"/>
+        <a:font script="Telu" typeface="Gautami"/>
+        <a:font script="Taml" typeface="Latha"/>
+        <a:font script="Syrc" typeface="Estrangelo Edessa"/>
+        <a:font script="Orya" typeface="Kalinga"/>
+        <a:font script="Mlym" typeface="Kartika"/>
+        <a:font script="Laoo" typeface="DokChampa"/>
+        <a:font script="Sinh" typeface="Iskoola Pota"/>
+        <a:font script="Mong" typeface="Mongolian Baiti"/>
+        <a:font script="Viet" typeface="Arial"/>
+        <a:font script="Uigh" typeface="Microsoft Uighur"/>
+        <a:font script="Geor" typeface="Sylfaen"/>
+        <a:font script="Armn" typeface="Arial"/>
+        <a:font script="Bugi" typeface="Leelawadee UI"/>
+        <a:font script="Bopo" typeface="Microsoft JhengHei"/>
+        <a:font script="Java" typeface="Javanese Text"/>
+        <a:font script="Lisu" typeface="Segoe UI"/>
+        <a:font script="Mymr" typeface="Myanmar Text"/>
+        <a:font script="Nkoo" typeface="Ebrima"/>
+        <a:font script="Olck" typeface="Nirmala UI"/>
+        <a:font script="Osma" typeface="Ebrima"/>
+        <a:font script="Phag" typeface="Phagspa"/>
+        <a:font script="Syrn" typeface="Estrangelo Edessa"/>
+        <a:font script="Syrj" typeface="Estrangelo Edessa"/>
+        <a:font script="Syre" typeface="Estrangelo Edessa"/>
+        <a:font script="Sora" typeface="Nirmala UI"/>
+        <a:font script="Tale" typeface="Microsoft Tai Le"/>
+        <a:font script="Talu" typeface="Microsoft New Tai Lue"/>
+        <a:font script="Tfng" typeface="Ebrima"/>
+      </a:minorFont>
+    </a:fontScheme>
+    <a:fmtScheme name="Office">
+      <a:fillStyleLst>
+        <a:solidFill>
+          <a:schemeClr val="phClr"/>
+        </a:solidFill>
+        <a:gradFill rotWithShape="1">
+          <a:gsLst>
+            <a:gs pos="0">
+              <a:schemeClr val="phClr">
+                <a:lumMod val="110000"/>
+                <a:satMod val="105000"/>
+                <a:tint val="67000"/>
+              </a:schemeClr>
+            </a:gs>
+            <a:gs pos="50000">
+              <a:schemeClr val="phClr">
+                <a:lumMod val="105000"/>
+                <a:satMod val="103000"/>
+                <a:tint val="73000"/>
+              </a:schemeClr>
+            </a:gs>
+            <a:gs pos="100000">
+              <a:schemeClr val="phClr">
+                <a:lumMod val="105000"/>
+                <a:satMod val="109000"/>
+                <a:tint val="81000"/>
+              </a:schemeClr>
+            </a:gs>
+          </a:gsLst>
+          <a:lin ang="5400000" scaled="0"/>
+        </a:gradFill>
+        <a:gradFill rotWithShape="1">
+          <a:gsLst>
+            <a:gs pos="0">
+              <a:schemeClr val="phClr">
+                <a:satMod val="103000"/>
+                <a:lumMod val="102000"/>
+                <a:tint val="94000"/>
+              </a:schemeClr>
+            </a:gs>
+            <a:gs pos="50000">
+              <a:schemeClr val="phClr">
+                <a:satMod val="110000"/>
+                <a:lumMod val="100000"/>
+                <a:shade val="100000"/>
+              </a:schemeClr>
+            </a:gs>
+            <a:gs pos="100000">
+              <a:schemeClr val="phClr">
+                <a:lumMod val="99000"/>
+                <a:satMod val="120000"/>
+                <a:shade val="78000"/>
+              </a:schemeClr>
+            </a:gs>
+          </a:gsLst>
+          <a:lin ang="5400000" scaled="0"/>
+        </a:gradFill>
+      </a:fillStyleLst>
+      <a:lnStyleLst>
+        <a:ln w="6350" cap="flat" cmpd="sng" algn="ctr">
+          <a:solidFill>
+            <a:schemeClr val="phClr"/>
+          </a:solidFill>
+          <a:prstDash val="solid"/>
+          <a:miter lim="800000"/>
+        </a:ln>
+        <a:ln w="12700" cap="flat" cmpd="sng" algn="ctr">
+          <a:solidFill>
+            <a:schemeClr val="phClr"/>
+          </a:solidFill>
+          <a:prstDash val="solid"/>
+          <a:miter lim="800000"/>
+        </a:ln>
+        <a:ln w="19050" cap="flat" cmpd="sng" algn="ctr">
+          <a:solidFill>
+            <a:schemeClr val="phClr"/>
+          </a:solidFill>
+          <a:prstDash val="solid"/>
+          <a:miter lim="800000"/>
+        </a:ln>
+      </a:lnStyleLst>
+      <a:effectStyleLst>
+        <a:effectStyle>
+          <a:effectLst/>
+        </a:effectStyle>
+        <a:effectStyle>
+          <a:effectLst/>
+        </a:effectStyle>
+        <a:effectStyle>
+          <a:effectLst>
+            <a:outerShdw blurRad="57150" dist="19050" dir="5400000" algn="ctr" rotWithShape="0">
+              <a:srgbClr val="000000">
+                <a:alpha val="63000"/>
+              </a:srgbClr>
+            </a:outerShdw>
+          </a:effectLst>
+        </a:effectStyle>
+      </a:effectStyleLst>
+      <a:bgFillStyleLst>
+        <a:solidFill>
+          <a:schemeClr val="phClr"/>
+        </a:solidFill>
+        <a:solidFill>
+          <a:schemeClr val="phClr">
+            <a:tint val="95000"/>
+            <a:satMod val="170000"/>
+          </a:schemeClr>
+        </a:solidFill>
+        <a:gradFill rotWithShape="1">
+          <a:gsLst>
+            <a:gs pos="0">
+              <a:schemeClr val="phClr">
+                <a:tint val="93000"/>
+                <a:satMod val="150000"/>
+                <a:shade val="98000"/>
+                <a:lumMod val="102000"/>
+              </a:schemeClr>
+            </a:gs>
+            <a:gs pos="50000">
+              <a:schemeClr val="phClr">
+                <a:tint val="98000"/>
+                <a:satMod val="130000"/>
+                <a:shade val="90000"/>
+                <a:lumMod val="103000"/>
+              </a:schemeClr>
+            </a:gs>
+            <a:gs pos="100000">
+              <a:schemeClr val="phClr">
+                <a:shade val="63000"/>
+                <a:satMod val="120000"/>
+              </a:schemeClr>
+            </a:gs>
+          </a:gsLst>
+          <a:lin ang="5400000" scaled="0"/>
+        </a:gradFill>
+      </a:bgFillStyleLst>
+    </a:fmtScheme>
+  </a:themeElements>
+  <a:objectDefaults/>
+  <a:extraClrSchemeLst/>
+  <a:extLst>
+    <a:ext uri="{05A4C25C-085E-4340-85A3-A5531E510DB2}">
+      <thm15:themeFamily xmlns:thm15="http://schemas.microsoft.com/office/thememl/2012/main" name="Office Theme" id="{62F939B6-93AF-4DB8-9C6B-D6C7DFDC589F}" vid="{4A3C46E8-61CC-4603-A589-7422A47A8E4A}"/>
+    </a:ext>
+  </a:extLst>
+</a:theme>
 </file>
</xml_diff>